<commit_message>
changed a pp slide
</commit_message>
<xml_diff>
--- a/Project 1 Presentation .pptx
+++ b/Project 1 Presentation .pptx
@@ -127,6 +127,35 @@
 </p1510:revInfo>
 </file>
 
+<file path=ppt/changesInfos/changesInfo1.xml><?xml version="1.0" encoding="utf-8"?>
+<pc:chgInfo xmlns:a="http://schemas.openxmlformats.org/drawingml/2006/main" xmlns:r="http://schemas.openxmlformats.org/officeDocument/2006/relationships" xmlns:ac="http://schemas.microsoft.com/office/drawing/2013/main/command" xmlns:pc="http://schemas.microsoft.com/office/powerpoint/2013/main/command">
+  <pc:docChgLst>
+    <pc:chgData name="TJ" userId="eb5c6397510d1945" providerId="LiveId" clId="{B91C481D-8C79-4ACD-B99D-F35218F60C8F}"/>
+    <pc:docChg chg="modSld">
+      <pc:chgData name="TJ" userId="eb5c6397510d1945" providerId="LiveId" clId="{B91C481D-8C79-4ACD-B99D-F35218F60C8F}" dt="2023-08-15T20:22:57.346" v="9" actId="20577"/>
+      <pc:docMkLst>
+        <pc:docMk/>
+      </pc:docMkLst>
+      <pc:sldChg chg="modSp mod">
+        <pc:chgData name="TJ" userId="eb5c6397510d1945" providerId="LiveId" clId="{B91C481D-8C79-4ACD-B99D-F35218F60C8F}" dt="2023-08-15T20:22:57.346" v="9" actId="20577"/>
+        <pc:sldMkLst>
+          <pc:docMk/>
+          <pc:sldMk cId="1975536614" sldId="263"/>
+        </pc:sldMkLst>
+        <pc:spChg chg="mod">
+          <ac:chgData name="TJ" userId="eb5c6397510d1945" providerId="LiveId" clId="{B91C481D-8C79-4ACD-B99D-F35218F60C8F}" dt="2023-08-15T20:22:57.346" v="9" actId="20577"/>
+          <ac:spMkLst>
+            <pc:docMk/>
+            <pc:sldMk cId="1975536614" sldId="263"/>
+            <ac:spMk id="2" creationId="{7506558A-862F-9EC0-1789-1F7AE94DD68C}"/>
+          </ac:spMkLst>
+        </pc:spChg>
+      </pc:sldChg>
+    </pc:docChg>
+  </pc:docChgLst>
+</pc:chgInfo>
+</file>
+
 <file path=ppt/slideLayouts/slideLayout1.xml><?xml version="1.0" encoding="utf-8"?>
 <p:sldLayout xmlns:a="http://schemas.openxmlformats.org/drawingml/2006/main" xmlns:r="http://schemas.openxmlformats.org/officeDocument/2006/relationships" xmlns:p="http://schemas.openxmlformats.org/presentationml/2006/main" type="title" preserve="1">
   <p:cSld name="Title Slide">
@@ -313,7 +342,7 @@
           <a:p>
             <a:fld id="{4AAD347D-5ACD-4C99-B74B-A9C85AD731AF}" type="datetimeFigureOut">
               <a:rPr lang="en-US" dirty="0"/>
-              <a:t>8/14/2023</a:t>
+              <a:t>8/15/2023</a:t>
             </a:fld>
             <a:endParaRPr lang="en-US" dirty="0"/>
           </a:p>
@@ -583,7 +612,7 @@
           <a:p>
             <a:fld id="{4509A250-FF31-4206-8172-F9D3106AACB1}" type="datetimeFigureOut">
               <a:rPr lang="en-US" dirty="0"/>
-              <a:t>8/14/2023</a:t>
+              <a:t>8/15/2023</a:t>
             </a:fld>
             <a:endParaRPr lang="en-US" dirty="0"/>
           </a:p>
@@ -772,7 +801,7 @@
           <a:p>
             <a:fld id="{4509A250-FF31-4206-8172-F9D3106AACB1}" type="datetimeFigureOut">
               <a:rPr lang="en-US" dirty="0"/>
-              <a:t>8/14/2023</a:t>
+              <a:t>8/15/2023</a:t>
             </a:fld>
             <a:endParaRPr lang="en-US" dirty="0"/>
           </a:p>
@@ -1040,7 +1069,7 @@
           <a:p>
             <a:fld id="{4509A250-FF31-4206-8172-F9D3106AACB1}" type="datetimeFigureOut">
               <a:rPr lang="en-US" dirty="0"/>
-              <a:t>8/14/2023</a:t>
+              <a:t>8/15/2023</a:t>
             </a:fld>
             <a:endParaRPr lang="en-US" dirty="0"/>
           </a:p>
@@ -1376,7 +1405,7 @@
           <a:p>
             <a:fld id="{4509A250-FF31-4206-8172-F9D3106AACB1}" type="datetimeFigureOut">
               <a:rPr lang="en-US" dirty="0"/>
-              <a:t>8/14/2023</a:t>
+              <a:t>8/15/2023</a:t>
             </a:fld>
             <a:endParaRPr lang="en-US" dirty="0"/>
           </a:p>
@@ -1994,7 +2023,7 @@
           <a:p>
             <a:fld id="{4509A250-FF31-4206-8172-F9D3106AACB1}" type="datetimeFigureOut">
               <a:rPr lang="en-US" dirty="0"/>
-              <a:t>8/14/2023</a:t>
+              <a:t>8/15/2023</a:t>
             </a:fld>
             <a:endParaRPr lang="en-US" dirty="0"/>
           </a:p>
@@ -2849,7 +2878,7 @@
           <a:p>
             <a:fld id="{4509A250-FF31-4206-8172-F9D3106AACB1}" type="datetimeFigureOut">
               <a:rPr lang="en-US" dirty="0"/>
-              <a:t>8/14/2023</a:t>
+              <a:t>8/15/2023</a:t>
             </a:fld>
             <a:endParaRPr lang="en-US" dirty="0"/>
           </a:p>
@@ -3014,7 +3043,7 @@
           <a:p>
             <a:fld id="{4509A250-FF31-4206-8172-F9D3106AACB1}" type="datetimeFigureOut">
               <a:rPr lang="en-US" dirty="0"/>
-              <a:t>8/14/2023</a:t>
+              <a:t>8/15/2023</a:t>
             </a:fld>
             <a:endParaRPr lang="en-US" dirty="0"/>
           </a:p>
@@ -3189,7 +3218,7 @@
           <a:p>
             <a:fld id="{4509A250-FF31-4206-8172-F9D3106AACB1}" type="datetimeFigureOut">
               <a:rPr lang="en-US" dirty="0"/>
-              <a:t>8/14/2023</a:t>
+              <a:t>8/15/2023</a:t>
             </a:fld>
             <a:endParaRPr lang="en-US" dirty="0"/>
           </a:p>
@@ -3354,7 +3383,7 @@
           <a:p>
             <a:fld id="{4509A250-FF31-4206-8172-F9D3106AACB1}" type="datetimeFigureOut">
               <a:rPr lang="en-US" dirty="0"/>
-              <a:t>8/14/2023</a:t>
+              <a:t>8/15/2023</a:t>
             </a:fld>
             <a:endParaRPr lang="en-US" dirty="0"/>
           </a:p>
@@ -3596,7 +3625,7 @@
           <a:p>
             <a:fld id="{9796027F-7875-4030-9381-8BD8C4F21935}" type="datetimeFigureOut">
               <a:rPr lang="en-US" dirty="0"/>
-              <a:t>8/14/2023</a:t>
+              <a:t>8/15/2023</a:t>
             </a:fld>
             <a:endParaRPr lang="en-US" dirty="0"/>
           </a:p>
@@ -3883,7 +3912,7 @@
           <a:p>
             <a:fld id="{9796027F-7875-4030-9381-8BD8C4F21935}" type="datetimeFigureOut">
               <a:rPr lang="en-US" dirty="0"/>
-              <a:t>8/14/2023</a:t>
+              <a:t>8/15/2023</a:t>
             </a:fld>
             <a:endParaRPr lang="en-US" dirty="0"/>
           </a:p>
@@ -4322,7 +4351,7 @@
           <a:p>
             <a:fld id="{9796027F-7875-4030-9381-8BD8C4F21935}" type="datetimeFigureOut">
               <a:rPr lang="en-US" dirty="0"/>
-              <a:t>8/14/2023</a:t>
+              <a:t>8/15/2023</a:t>
             </a:fld>
             <a:endParaRPr lang="en-US" dirty="0"/>
           </a:p>
@@ -4435,7 +4464,7 @@
           <a:p>
             <a:fld id="{4509A250-FF31-4206-8172-F9D3106AACB1}" type="datetimeFigureOut">
               <a:rPr lang="en-US" dirty="0"/>
-              <a:t>8/14/2023</a:t>
+              <a:t>8/15/2023</a:t>
             </a:fld>
             <a:endParaRPr lang="en-US" dirty="0"/>
           </a:p>
@@ -4525,7 +4554,7 @@
           <a:p>
             <a:fld id="{4509A250-FF31-4206-8172-F9D3106AACB1}" type="datetimeFigureOut">
               <a:rPr lang="en-US" dirty="0"/>
-              <a:t>8/14/2023</a:t>
+              <a:t>8/15/2023</a:t>
             </a:fld>
             <a:endParaRPr lang="en-US" dirty="0"/>
           </a:p>
@@ -4799,7 +4828,7 @@
           <a:p>
             <a:fld id="{4509A250-FF31-4206-8172-F9D3106AACB1}" type="datetimeFigureOut">
               <a:rPr lang="en-US" dirty="0"/>
-              <a:t>8/14/2023</a:t>
+              <a:t>8/15/2023</a:t>
             </a:fld>
             <a:endParaRPr lang="en-US" dirty="0"/>
           </a:p>
@@ -5069,7 +5098,7 @@
           <a:p>
             <a:fld id="{4509A250-FF31-4206-8172-F9D3106AACB1}" type="datetimeFigureOut">
               <a:rPr lang="en-US" dirty="0"/>
-              <a:t>8/14/2023</a:t>
+              <a:t>8/15/2023</a:t>
             </a:fld>
             <a:endParaRPr lang="en-US" dirty="0"/>
           </a:p>
@@ -5493,7 +5522,7 @@
           <a:p>
             <a:fld id="{4AAD347D-5ACD-4C99-B74B-A9C85AD731AF}" type="datetimeFigureOut">
               <a:rPr lang="en-US" dirty="0"/>
-              <a:t>8/14/2023</a:t>
+              <a:t>8/15/2023</a:t>
             </a:fld>
             <a:endParaRPr lang="en-US" dirty="0"/>
           </a:p>
@@ -6466,16 +6495,10 @@
           <a:lstStyle/>
           <a:p>
             <a:r>
-              <a:rPr lang="en-US">
-                <a:latin typeface="Amasis MT Pro Medium" panose="02040604050005020304" pitchFamily="18" charset="0"/>
-              </a:rPr>
-              <a:t>Were overall prices </a:t>
-            </a:r>
-            <a:r>
               <a:rPr lang="en-US" dirty="0">
                 <a:latin typeface="Amasis MT Pro Medium" panose="02040604050005020304" pitchFamily="18" charset="0"/>
               </a:rPr>
-              <a:t>effected?</a:t>
+              <a:t>Were overall prices affected?</a:t>
             </a:r>
           </a:p>
         </p:txBody>

</xml_diff>

<commit_message>
Added info to slides
</commit_message>
<xml_diff>
--- a/Project 1 Presentation .pptx
+++ b/Project 1 Presentation .pptx
@@ -123,6 +123,7 @@
 <p1510:revInfo xmlns:a="http://schemas.openxmlformats.org/drawingml/2006/main" xmlns:r="http://schemas.openxmlformats.org/officeDocument/2006/relationships" xmlns:p1510="http://schemas.microsoft.com/office/powerpoint/2015/10/main">
   <p1510:revLst>
     <p1510:client id="{29E56149-E9C9-4EDF-A6D3-627DB2CED916}" v="40" dt="2023-08-15T00:53:09.149"/>
+    <p1510:client id="{B91C481D-8C79-4ACD-B99D-F35218F60C8F}" v="3" dt="2023-08-15T20:36:27.165"/>
   </p1510:revLst>
 </p1510:revInfo>
 </file>
@@ -132,12 +133,58 @@
   <pc:docChgLst>
     <pc:chgData name="TJ" userId="eb5c6397510d1945" providerId="LiveId" clId="{B91C481D-8C79-4ACD-B99D-F35218F60C8F}"/>
     <pc:docChg chg="modSld">
-      <pc:chgData name="TJ" userId="eb5c6397510d1945" providerId="LiveId" clId="{B91C481D-8C79-4ACD-B99D-F35218F60C8F}" dt="2023-08-15T20:22:57.346" v="9" actId="20577"/>
+      <pc:chgData name="TJ" userId="eb5c6397510d1945" providerId="LiveId" clId="{B91C481D-8C79-4ACD-B99D-F35218F60C8F}" dt="2023-08-15T20:40:41.071" v="190" actId="113"/>
       <pc:docMkLst>
         <pc:docMk/>
       </pc:docMkLst>
-      <pc:sldChg chg="modSp mod">
-        <pc:chgData name="TJ" userId="eb5c6397510d1945" providerId="LiveId" clId="{B91C481D-8C79-4ACD-B99D-F35218F60C8F}" dt="2023-08-15T20:22:57.346" v="9" actId="20577"/>
+      <pc:sldChg chg="addSp modSp mod">
+        <pc:chgData name="TJ" userId="eb5c6397510d1945" providerId="LiveId" clId="{B91C481D-8C79-4ACD-B99D-F35218F60C8F}" dt="2023-08-15T20:40:26.241" v="188" actId="113"/>
+        <pc:sldMkLst>
+          <pc:docMk/>
+          <pc:sldMk cId="3257304099" sldId="257"/>
+        </pc:sldMkLst>
+        <pc:spChg chg="add mod">
+          <ac:chgData name="TJ" userId="eb5c6397510d1945" providerId="LiveId" clId="{B91C481D-8C79-4ACD-B99D-F35218F60C8F}" dt="2023-08-15T20:40:26.241" v="188" actId="113"/>
+          <ac:spMkLst>
+            <pc:docMk/>
+            <pc:sldMk cId="3257304099" sldId="257"/>
+            <ac:spMk id="3" creationId="{54489725-8FDE-6C03-FBB0-5E30A78D3C15}"/>
+          </ac:spMkLst>
+        </pc:spChg>
+        <pc:picChg chg="mod">
+          <ac:chgData name="TJ" userId="eb5c6397510d1945" providerId="LiveId" clId="{B91C481D-8C79-4ACD-B99D-F35218F60C8F}" dt="2023-08-15T20:33:18.555" v="13" actId="1076"/>
+          <ac:picMkLst>
+            <pc:docMk/>
+            <pc:sldMk cId="3257304099" sldId="257"/>
+            <ac:picMk id="6" creationId="{2AE004E3-5596-893A-D986-AD2B23EA096C}"/>
+          </ac:picMkLst>
+        </pc:picChg>
+      </pc:sldChg>
+      <pc:sldChg chg="addSp modSp mod">
+        <pc:chgData name="TJ" userId="eb5c6397510d1945" providerId="LiveId" clId="{B91C481D-8C79-4ACD-B99D-F35218F60C8F}" dt="2023-08-15T20:40:34.148" v="189" actId="113"/>
+        <pc:sldMkLst>
+          <pc:docMk/>
+          <pc:sldMk cId="935300625" sldId="258"/>
+        </pc:sldMkLst>
+        <pc:spChg chg="add mod">
+          <ac:chgData name="TJ" userId="eb5c6397510d1945" providerId="LiveId" clId="{B91C481D-8C79-4ACD-B99D-F35218F60C8F}" dt="2023-08-15T20:40:34.148" v="189" actId="113"/>
+          <ac:spMkLst>
+            <pc:docMk/>
+            <pc:sldMk cId="935300625" sldId="258"/>
+            <ac:spMk id="3" creationId="{24E5232F-3930-6756-FAB5-D383DC7EB23A}"/>
+          </ac:spMkLst>
+        </pc:spChg>
+        <pc:picChg chg="mod">
+          <ac:chgData name="TJ" userId="eb5c6397510d1945" providerId="LiveId" clId="{B91C481D-8C79-4ACD-B99D-F35218F60C8F}" dt="2023-08-15T20:35:12.501" v="134" actId="1076"/>
+          <ac:picMkLst>
+            <pc:docMk/>
+            <pc:sldMk cId="935300625" sldId="258"/>
+            <ac:picMk id="6" creationId="{6283C8A4-DA6D-6708-5E7A-5FCC6DC65883}"/>
+          </ac:picMkLst>
+        </pc:picChg>
+      </pc:sldChg>
+      <pc:sldChg chg="addSp modSp mod">
+        <pc:chgData name="TJ" userId="eb5c6397510d1945" providerId="LiveId" clId="{B91C481D-8C79-4ACD-B99D-F35218F60C8F}" dt="2023-08-15T20:40:41.071" v="190" actId="113"/>
         <pc:sldMkLst>
           <pc:docMk/>
           <pc:sldMk cId="1975536614" sldId="263"/>
@@ -150,6 +197,22 @@
             <ac:spMk id="2" creationId="{7506558A-862F-9EC0-1789-1F7AE94DD68C}"/>
           </ac:spMkLst>
         </pc:spChg>
+        <pc:spChg chg="add mod">
+          <ac:chgData name="TJ" userId="eb5c6397510d1945" providerId="LiveId" clId="{B91C481D-8C79-4ACD-B99D-F35218F60C8F}" dt="2023-08-15T20:40:41.071" v="190" actId="113"/>
+          <ac:spMkLst>
+            <pc:docMk/>
+            <pc:sldMk cId="1975536614" sldId="263"/>
+            <ac:spMk id="3" creationId="{F29A1C12-95CF-3EA0-3C05-135707E4CCB8}"/>
+          </ac:spMkLst>
+        </pc:spChg>
+        <pc:picChg chg="mod">
+          <ac:chgData name="TJ" userId="eb5c6397510d1945" providerId="LiveId" clId="{B91C481D-8C79-4ACD-B99D-F35218F60C8F}" dt="2023-08-15T20:36:21.801" v="166" actId="1076"/>
+          <ac:picMkLst>
+            <pc:docMk/>
+            <pc:sldMk cId="1975536614" sldId="263"/>
+            <ac:picMk id="6" creationId="{C2605F48-2D83-10A0-6934-B76D76821AA6}"/>
+          </ac:picMkLst>
+        </pc:picChg>
       </pc:sldChg>
     </pc:docChg>
   </pc:docChgLst>
@@ -6349,11 +6412,46 @@
         </p:blipFill>
         <p:spPr>
           <a:xfrm>
-            <a:off x="646111" y="1380356"/>
-            <a:ext cx="9798183" cy="4899091"/>
+            <a:off x="710770" y="1671383"/>
+            <a:ext cx="8256969" cy="4128484"/>
           </a:xfrm>
         </p:spPr>
       </p:pic>
+      <p:sp>
+        <p:nvSpPr>
+          <p:cNvPr id="3" name="TextBox 2">
+            <a:extLst>
+              <a:ext uri="{FF2B5EF4-FFF2-40B4-BE49-F238E27FC236}">
+                <a16:creationId xmlns:a16="http://schemas.microsoft.com/office/drawing/2014/main" id="{54489725-8FDE-6C03-FBB0-5E30A78D3C15}"/>
+              </a:ext>
+            </a:extLst>
+          </p:cNvPr>
+          <p:cNvSpPr txBox="1"/>
+          <p:nvPr/>
+        </p:nvSpPr>
+        <p:spPr>
+          <a:xfrm>
+            <a:off x="9428723" y="3094883"/>
+            <a:ext cx="2628215" cy="707886"/>
+          </a:xfrm>
+          <a:prstGeom prst="rect">
+            <a:avLst/>
+          </a:prstGeom>
+          <a:noFill/>
+        </p:spPr>
+        <p:txBody>
+          <a:bodyPr wrap="square" rtlCol="0">
+            <a:spAutoFit/>
+          </a:bodyPr>
+          <a:lstStyle/>
+          <a:p>
+            <a:r>
+              <a:rPr lang="en-US" sz="2000" b="1" dirty="0"/>
+              <a:t>Units sold declined                                  20%</a:t>
+            </a:r>
+          </a:p>
+        </p:txBody>
+      </p:sp>
     </p:spTree>
     <p:extLst>
       <p:ext uri="{BB962C8B-B14F-4D97-AF65-F5344CB8AC3E}">
@@ -6438,11 +6536,46 @@
         </p:blipFill>
         <p:spPr>
           <a:xfrm>
-            <a:off x="646111" y="1466344"/>
-            <a:ext cx="9957573" cy="4978786"/>
+            <a:off x="646111" y="1745592"/>
+            <a:ext cx="8569070" cy="4284535"/>
           </a:xfrm>
         </p:spPr>
       </p:pic>
+      <p:sp>
+        <p:nvSpPr>
+          <p:cNvPr id="3" name="TextBox 2">
+            <a:extLst>
+              <a:ext uri="{FF2B5EF4-FFF2-40B4-BE49-F238E27FC236}">
+                <a16:creationId xmlns:a16="http://schemas.microsoft.com/office/drawing/2014/main" id="{24E5232F-3930-6756-FAB5-D383DC7EB23A}"/>
+              </a:ext>
+            </a:extLst>
+          </p:cNvPr>
+          <p:cNvSpPr txBox="1"/>
+          <p:nvPr/>
+        </p:nvSpPr>
+        <p:spPr>
+          <a:xfrm>
+            <a:off x="9525457" y="3098362"/>
+            <a:ext cx="2666543" cy="661275"/>
+          </a:xfrm>
+          <a:prstGeom prst="rect">
+            <a:avLst/>
+          </a:prstGeom>
+          <a:noFill/>
+        </p:spPr>
+        <p:txBody>
+          <a:bodyPr wrap="square" rtlCol="0">
+            <a:spAutoFit/>
+          </a:bodyPr>
+          <a:lstStyle/>
+          <a:p>
+            <a:r>
+              <a:rPr lang="en-US" b="1" dirty="0"/>
+              <a:t>Total Revenue rose 27%</a:t>
+            </a:r>
+          </a:p>
+        </p:txBody>
+      </p:sp>
     </p:spTree>
     <p:extLst>
       <p:ext uri="{BB962C8B-B14F-4D97-AF65-F5344CB8AC3E}">
@@ -6527,11 +6660,46 @@
         </p:blipFill>
         <p:spPr>
           <a:xfrm>
-            <a:off x="646111" y="1455859"/>
-            <a:ext cx="9898850" cy="4949424"/>
+            <a:off x="684439" y="1771115"/>
+            <a:ext cx="8361395" cy="4180697"/>
           </a:xfrm>
         </p:spPr>
       </p:pic>
+      <p:sp>
+        <p:nvSpPr>
+          <p:cNvPr id="3" name="TextBox 2">
+            <a:extLst>
+              <a:ext uri="{FF2B5EF4-FFF2-40B4-BE49-F238E27FC236}">
+                <a16:creationId xmlns:a16="http://schemas.microsoft.com/office/drawing/2014/main" id="{F29A1C12-95CF-3EA0-3C05-135707E4CCB8}"/>
+              </a:ext>
+            </a:extLst>
+          </p:cNvPr>
+          <p:cNvSpPr txBox="1"/>
+          <p:nvPr/>
+        </p:nvSpPr>
+        <p:spPr>
+          <a:xfrm>
+            <a:off x="9406822" y="3210032"/>
+            <a:ext cx="2675989" cy="523220"/>
+          </a:xfrm>
+          <a:prstGeom prst="rect">
+            <a:avLst/>
+          </a:prstGeom>
+          <a:noFill/>
+        </p:spPr>
+        <p:txBody>
+          <a:bodyPr wrap="square" rtlCol="0">
+            <a:spAutoFit/>
+          </a:bodyPr>
+          <a:lstStyle/>
+          <a:p>
+            <a:r>
+              <a:rPr lang="en-US" sz="2800" b="1" dirty="0"/>
+              <a:t>CPI rose 40%</a:t>
+            </a:r>
+          </a:p>
+        </p:txBody>
+      </p:sp>
     </p:spTree>
     <p:extLst>
       <p:ext uri="{BB962C8B-B14F-4D97-AF65-F5344CB8AC3E}">

</xml_diff>

<commit_message>
added more info and notes to presentation
</commit_message>
<xml_diff>
--- a/Project 1 Presentation .pptx
+++ b/Project 1 Presentation .pptx
@@ -4,15 +4,17 @@
   <p:sldMasterIdLst>
     <p:sldMasterId id="2147483648" r:id="rId1"/>
   </p:sldMasterIdLst>
+  <p:notesMasterIdLst>
+    <p:notesMasterId r:id="rId9"/>
+  </p:notesMasterIdLst>
   <p:sldIdLst>
     <p:sldId id="256" r:id="rId2"/>
     <p:sldId id="257" r:id="rId3"/>
-    <p:sldId id="258" r:id="rId4"/>
-    <p:sldId id="263" r:id="rId5"/>
-    <p:sldId id="259" r:id="rId6"/>
-    <p:sldId id="260" r:id="rId7"/>
-    <p:sldId id="261" r:id="rId8"/>
-    <p:sldId id="262" r:id="rId9"/>
+    <p:sldId id="263" r:id="rId4"/>
+    <p:sldId id="259" r:id="rId5"/>
+    <p:sldId id="260" r:id="rId6"/>
+    <p:sldId id="261" r:id="rId7"/>
+    <p:sldId id="262" r:id="rId8"/>
   </p:sldIdLst>
   <p:sldSz cx="12192000" cy="6858000"/>
   <p:notesSz cx="6858000" cy="9144000"/>
@@ -122,7 +124,7 @@
 <file path=ppt/revisionInfo.xml><?xml version="1.0" encoding="utf-8"?>
 <p1510:revInfo xmlns:a="http://schemas.openxmlformats.org/drawingml/2006/main" xmlns:r="http://schemas.openxmlformats.org/officeDocument/2006/relationships" xmlns:p1510="http://schemas.microsoft.com/office/powerpoint/2015/10/main">
   <p1510:revLst>
-    <p1510:client id="{29E56149-E9C9-4EDF-A6D3-627DB2CED916}" v="40" dt="2023-08-15T00:53:09.149"/>
+    <p1510:client id="{A21625FD-0973-4D47-987E-B56EF70EDD32}" v="1" dt="2023-08-16T00:56:08.095"/>
     <p1510:client id="{B91C481D-8C79-4ACD-B99D-F35218F60C8F}" v="3" dt="2023-08-15T20:36:27.165"/>
   </p1510:revLst>
 </p1510:revInfo>
@@ -216,7 +218,1224 @@
       </pc:sldChg>
     </pc:docChg>
   </pc:docChgLst>
+  <pc:docChgLst>
+    <pc:chgData name="TJ Davis" userId="2472d7e42abb0c91" providerId="LiveId" clId="{A21625FD-0973-4D47-987E-B56EF70EDD32}"/>
+    <pc:docChg chg="custSel delSld modSld">
+      <pc:chgData name="TJ Davis" userId="2472d7e42abb0c91" providerId="LiveId" clId="{A21625FD-0973-4D47-987E-B56EF70EDD32}" dt="2023-08-16T00:59:37.332" v="806"/>
+      <pc:docMkLst>
+        <pc:docMk/>
+      </pc:docMkLst>
+      <pc:sldChg chg="modNotesTx">
+        <pc:chgData name="TJ Davis" userId="2472d7e42abb0c91" providerId="LiveId" clId="{A21625FD-0973-4D47-987E-B56EF70EDD32}" dt="2023-08-16T00:49:41.514" v="248" actId="20577"/>
+        <pc:sldMkLst>
+          <pc:docMk/>
+          <pc:sldMk cId="592841126" sldId="256"/>
+        </pc:sldMkLst>
+      </pc:sldChg>
+      <pc:sldChg chg="addSp modSp mod modNotesTx">
+        <pc:chgData name="TJ Davis" userId="2472d7e42abb0c91" providerId="LiveId" clId="{A21625FD-0973-4D47-987E-B56EF70EDD32}" dt="2023-08-16T00:59:24.121" v="805" actId="20577"/>
+        <pc:sldMkLst>
+          <pc:docMk/>
+          <pc:sldMk cId="3257304099" sldId="257"/>
+        </pc:sldMkLst>
+        <pc:spChg chg="mod">
+          <ac:chgData name="TJ Davis" userId="2472d7e42abb0c91" providerId="LiveId" clId="{A21625FD-0973-4D47-987E-B56EF70EDD32}" dt="2023-08-16T00:58:10.823" v="799" actId="1076"/>
+          <ac:spMkLst>
+            <pc:docMk/>
+            <pc:sldMk cId="3257304099" sldId="257"/>
+            <ac:spMk id="3" creationId="{54489725-8FDE-6C03-FBB0-5E30A78D3C15}"/>
+          </ac:spMkLst>
+        </pc:spChg>
+        <pc:spChg chg="add mod">
+          <ac:chgData name="TJ Davis" userId="2472d7e42abb0c91" providerId="LiveId" clId="{A21625FD-0973-4D47-987E-B56EF70EDD32}" dt="2023-08-16T00:58:20.208" v="800" actId="1076"/>
+          <ac:spMkLst>
+            <pc:docMk/>
+            <pc:sldMk cId="3257304099" sldId="257"/>
+            <ac:spMk id="7" creationId="{C8BAEDF2-FAEE-F902-2393-8E51D40471E1}"/>
+          </ac:spMkLst>
+        </pc:spChg>
+        <pc:picChg chg="add mod">
+          <ac:chgData name="TJ Davis" userId="2472d7e42abb0c91" providerId="LiveId" clId="{A21625FD-0973-4D47-987E-B56EF70EDD32}" dt="2023-08-16T00:56:47.950" v="780" actId="1076"/>
+          <ac:picMkLst>
+            <pc:docMk/>
+            <pc:sldMk cId="3257304099" sldId="257"/>
+            <ac:picMk id="4" creationId="{846E6031-B1C5-7DC4-3F3A-183FA8DA00B8}"/>
+          </ac:picMkLst>
+        </pc:picChg>
+        <pc:picChg chg="mod">
+          <ac:chgData name="TJ Davis" userId="2472d7e42abb0c91" providerId="LiveId" clId="{A21625FD-0973-4D47-987E-B56EF70EDD32}" dt="2023-08-16T00:56:46.070" v="779" actId="1076"/>
+          <ac:picMkLst>
+            <pc:docMk/>
+            <pc:sldMk cId="3257304099" sldId="257"/>
+            <ac:picMk id="6" creationId="{2AE004E3-5596-893A-D986-AD2B23EA096C}"/>
+          </ac:picMkLst>
+        </pc:picChg>
+      </pc:sldChg>
+      <pc:sldChg chg="del">
+        <pc:chgData name="TJ Davis" userId="2472d7e42abb0c91" providerId="LiveId" clId="{A21625FD-0973-4D47-987E-B56EF70EDD32}" dt="2023-08-16T00:58:54.184" v="801" actId="2696"/>
+        <pc:sldMkLst>
+          <pc:docMk/>
+          <pc:sldMk cId="935300625" sldId="258"/>
+        </pc:sldMkLst>
+      </pc:sldChg>
+      <pc:sldChg chg="modNotesTx">
+        <pc:chgData name="TJ Davis" userId="2472d7e42abb0c91" providerId="LiveId" clId="{A21625FD-0973-4D47-987E-B56EF70EDD32}" dt="2023-08-16T00:59:37.332" v="806"/>
+        <pc:sldMkLst>
+          <pc:docMk/>
+          <pc:sldMk cId="1975536614" sldId="263"/>
+        </pc:sldMkLst>
+      </pc:sldChg>
+    </pc:docChg>
+  </pc:docChgLst>
 </pc:chgInfo>
+</file>
+
+<file path=ppt/notesMasters/notesMaster1.xml><?xml version="1.0" encoding="utf-8"?>
+<p:notesMaster xmlns:a="http://schemas.openxmlformats.org/drawingml/2006/main" xmlns:r="http://schemas.openxmlformats.org/officeDocument/2006/relationships" xmlns:p="http://schemas.openxmlformats.org/presentationml/2006/main">
+  <p:cSld>
+    <p:bg>
+      <p:bgRef idx="1001">
+        <a:schemeClr val="bg1"/>
+      </p:bgRef>
+    </p:bg>
+    <p:spTree>
+      <p:nvGrpSpPr>
+        <p:cNvPr id="1" name=""/>
+        <p:cNvGrpSpPr/>
+        <p:nvPr/>
+      </p:nvGrpSpPr>
+      <p:grpSpPr>
+        <a:xfrm>
+          <a:off x="0" y="0"/>
+          <a:ext cx="0" cy="0"/>
+          <a:chOff x="0" y="0"/>
+          <a:chExt cx="0" cy="0"/>
+        </a:xfrm>
+      </p:grpSpPr>
+      <p:sp>
+        <p:nvSpPr>
+          <p:cNvPr id="2" name="Header Placeholder 1"/>
+          <p:cNvSpPr>
+            <a:spLocks noGrp="1"/>
+          </p:cNvSpPr>
+          <p:nvPr>
+            <p:ph type="hdr" sz="quarter"/>
+          </p:nvPr>
+        </p:nvSpPr>
+        <p:spPr>
+          <a:xfrm>
+            <a:off x="0" y="0"/>
+            <a:ext cx="2971800" cy="458788"/>
+          </a:xfrm>
+          <a:prstGeom prst="rect">
+            <a:avLst/>
+          </a:prstGeom>
+        </p:spPr>
+        <p:txBody>
+          <a:bodyPr vert="horz" lIns="91440" tIns="45720" rIns="91440" bIns="45720" rtlCol="0"/>
+          <a:lstStyle>
+            <a:lvl1pPr algn="l">
+              <a:defRPr sz="1200"/>
+            </a:lvl1pPr>
+          </a:lstStyle>
+          <a:p>
+            <a:endParaRPr lang="en-US"/>
+          </a:p>
+        </p:txBody>
+      </p:sp>
+      <p:sp>
+        <p:nvSpPr>
+          <p:cNvPr id="3" name="Date Placeholder 2"/>
+          <p:cNvSpPr>
+            <a:spLocks noGrp="1"/>
+          </p:cNvSpPr>
+          <p:nvPr>
+            <p:ph type="dt" idx="1"/>
+          </p:nvPr>
+        </p:nvSpPr>
+        <p:spPr>
+          <a:xfrm>
+            <a:off x="3884613" y="0"/>
+            <a:ext cx="2971800" cy="458788"/>
+          </a:xfrm>
+          <a:prstGeom prst="rect">
+            <a:avLst/>
+          </a:prstGeom>
+        </p:spPr>
+        <p:txBody>
+          <a:bodyPr vert="horz" lIns="91440" tIns="45720" rIns="91440" bIns="45720" rtlCol="0"/>
+          <a:lstStyle>
+            <a:lvl1pPr algn="r">
+              <a:defRPr sz="1200"/>
+            </a:lvl1pPr>
+          </a:lstStyle>
+          <a:p>
+            <a:fld id="{41C4FDF3-21A6-4034-A282-AAE986CD098F}" type="datetimeFigureOut">
+              <a:rPr lang="en-US" smtClean="0"/>
+              <a:t>8/15/2023</a:t>
+            </a:fld>
+            <a:endParaRPr lang="en-US"/>
+          </a:p>
+        </p:txBody>
+      </p:sp>
+      <p:sp>
+        <p:nvSpPr>
+          <p:cNvPr id="4" name="Slide Image Placeholder 3"/>
+          <p:cNvSpPr>
+            <a:spLocks noGrp="1" noRot="1" noChangeAspect="1"/>
+          </p:cNvSpPr>
+          <p:nvPr>
+            <p:ph type="sldImg" idx="2"/>
+          </p:nvPr>
+        </p:nvSpPr>
+        <p:spPr>
+          <a:xfrm>
+            <a:off x="685800" y="1143000"/>
+            <a:ext cx="5486400" cy="3086100"/>
+          </a:xfrm>
+          <a:prstGeom prst="rect">
+            <a:avLst/>
+          </a:prstGeom>
+          <a:noFill/>
+          <a:ln w="12700">
+            <a:solidFill>
+              <a:prstClr val="black"/>
+            </a:solidFill>
+          </a:ln>
+        </p:spPr>
+        <p:txBody>
+          <a:bodyPr vert="horz" lIns="91440" tIns="45720" rIns="91440" bIns="45720" rtlCol="0" anchor="ctr"/>
+          <a:lstStyle/>
+          <a:p>
+            <a:endParaRPr lang="en-US"/>
+          </a:p>
+        </p:txBody>
+      </p:sp>
+      <p:sp>
+        <p:nvSpPr>
+          <p:cNvPr id="5" name="Notes Placeholder 4"/>
+          <p:cNvSpPr>
+            <a:spLocks noGrp="1"/>
+          </p:cNvSpPr>
+          <p:nvPr>
+            <p:ph type="body" sz="quarter" idx="3"/>
+          </p:nvPr>
+        </p:nvSpPr>
+        <p:spPr>
+          <a:xfrm>
+            <a:off x="685800" y="4400550"/>
+            <a:ext cx="5486400" cy="3600450"/>
+          </a:xfrm>
+          <a:prstGeom prst="rect">
+            <a:avLst/>
+          </a:prstGeom>
+        </p:spPr>
+        <p:txBody>
+          <a:bodyPr vert="horz" lIns="91440" tIns="45720" rIns="91440" bIns="45720" rtlCol="0"/>
+          <a:lstStyle/>
+          <a:p>
+            <a:pPr lvl="0"/>
+            <a:r>
+              <a:rPr lang="en-US"/>
+              <a:t>Click to edit Master text styles</a:t>
+            </a:r>
+          </a:p>
+          <a:p>
+            <a:pPr lvl="1"/>
+            <a:r>
+              <a:rPr lang="en-US"/>
+              <a:t>Second level</a:t>
+            </a:r>
+          </a:p>
+          <a:p>
+            <a:pPr lvl="2"/>
+            <a:r>
+              <a:rPr lang="en-US"/>
+              <a:t>Third level</a:t>
+            </a:r>
+          </a:p>
+          <a:p>
+            <a:pPr lvl="3"/>
+            <a:r>
+              <a:rPr lang="en-US"/>
+              <a:t>Fourth level</a:t>
+            </a:r>
+          </a:p>
+          <a:p>
+            <a:pPr lvl="4"/>
+            <a:r>
+              <a:rPr lang="en-US"/>
+              <a:t>Fifth level</a:t>
+            </a:r>
+          </a:p>
+        </p:txBody>
+      </p:sp>
+      <p:sp>
+        <p:nvSpPr>
+          <p:cNvPr id="6" name="Footer Placeholder 5"/>
+          <p:cNvSpPr>
+            <a:spLocks noGrp="1"/>
+          </p:cNvSpPr>
+          <p:nvPr>
+            <p:ph type="ftr" sz="quarter" idx="4"/>
+          </p:nvPr>
+        </p:nvSpPr>
+        <p:spPr>
+          <a:xfrm>
+            <a:off x="0" y="8685213"/>
+            <a:ext cx="2971800" cy="458787"/>
+          </a:xfrm>
+          <a:prstGeom prst="rect">
+            <a:avLst/>
+          </a:prstGeom>
+        </p:spPr>
+        <p:txBody>
+          <a:bodyPr vert="horz" lIns="91440" tIns="45720" rIns="91440" bIns="45720" rtlCol="0" anchor="b"/>
+          <a:lstStyle>
+            <a:lvl1pPr algn="l">
+              <a:defRPr sz="1200"/>
+            </a:lvl1pPr>
+          </a:lstStyle>
+          <a:p>
+            <a:endParaRPr lang="en-US"/>
+          </a:p>
+        </p:txBody>
+      </p:sp>
+      <p:sp>
+        <p:nvSpPr>
+          <p:cNvPr id="7" name="Slide Number Placeholder 6"/>
+          <p:cNvSpPr>
+            <a:spLocks noGrp="1"/>
+          </p:cNvSpPr>
+          <p:nvPr>
+            <p:ph type="sldNum" sz="quarter" idx="5"/>
+          </p:nvPr>
+        </p:nvSpPr>
+        <p:spPr>
+          <a:xfrm>
+            <a:off x="3884613" y="8685213"/>
+            <a:ext cx="2971800" cy="458787"/>
+          </a:xfrm>
+          <a:prstGeom prst="rect">
+            <a:avLst/>
+          </a:prstGeom>
+        </p:spPr>
+        <p:txBody>
+          <a:bodyPr vert="horz" lIns="91440" tIns="45720" rIns="91440" bIns="45720" rtlCol="0" anchor="b"/>
+          <a:lstStyle>
+            <a:lvl1pPr algn="r">
+              <a:defRPr sz="1200"/>
+            </a:lvl1pPr>
+          </a:lstStyle>
+          <a:p>
+            <a:fld id="{95646C1A-F1D7-49BA-A1FF-7E74335FB05C}" type="slidenum">
+              <a:rPr lang="en-US" smtClean="0"/>
+              <a:t>‹#›</a:t>
+            </a:fld>
+            <a:endParaRPr lang="en-US"/>
+          </a:p>
+        </p:txBody>
+      </p:sp>
+    </p:spTree>
+    <p:extLst>
+      <p:ext uri="{BB962C8B-B14F-4D97-AF65-F5344CB8AC3E}">
+        <p14:creationId xmlns:p14="http://schemas.microsoft.com/office/powerpoint/2010/main" val="1938445548"/>
+      </p:ext>
+    </p:extLst>
+  </p:cSld>
+  <p:clrMap bg1="lt1" tx1="dk1" bg2="lt2" tx2="dk2" accent1="accent1" accent2="accent2" accent3="accent3" accent4="accent4" accent5="accent5" accent6="accent6" hlink="hlink" folHlink="folHlink"/>
+  <p:notesStyle>
+    <a:lvl1pPr marL="0" algn="l" defTabSz="914400" rtl="0" eaLnBrk="1" latinLnBrk="0" hangingPunct="1">
+      <a:defRPr sz="1200" kern="1200">
+        <a:solidFill>
+          <a:schemeClr val="tx1"/>
+        </a:solidFill>
+        <a:latin typeface="+mn-lt"/>
+        <a:ea typeface="+mn-ea"/>
+        <a:cs typeface="+mn-cs"/>
+      </a:defRPr>
+    </a:lvl1pPr>
+    <a:lvl2pPr marL="457200" algn="l" defTabSz="914400" rtl="0" eaLnBrk="1" latinLnBrk="0" hangingPunct="1">
+      <a:defRPr sz="1200" kern="1200">
+        <a:solidFill>
+          <a:schemeClr val="tx1"/>
+        </a:solidFill>
+        <a:latin typeface="+mn-lt"/>
+        <a:ea typeface="+mn-ea"/>
+        <a:cs typeface="+mn-cs"/>
+      </a:defRPr>
+    </a:lvl2pPr>
+    <a:lvl3pPr marL="914400" algn="l" defTabSz="914400" rtl="0" eaLnBrk="1" latinLnBrk="0" hangingPunct="1">
+      <a:defRPr sz="1200" kern="1200">
+        <a:solidFill>
+          <a:schemeClr val="tx1"/>
+        </a:solidFill>
+        <a:latin typeface="+mn-lt"/>
+        <a:ea typeface="+mn-ea"/>
+        <a:cs typeface="+mn-cs"/>
+      </a:defRPr>
+    </a:lvl3pPr>
+    <a:lvl4pPr marL="1371600" algn="l" defTabSz="914400" rtl="0" eaLnBrk="1" latinLnBrk="0" hangingPunct="1">
+      <a:defRPr sz="1200" kern="1200">
+        <a:solidFill>
+          <a:schemeClr val="tx1"/>
+        </a:solidFill>
+        <a:latin typeface="+mn-lt"/>
+        <a:ea typeface="+mn-ea"/>
+        <a:cs typeface="+mn-cs"/>
+      </a:defRPr>
+    </a:lvl4pPr>
+    <a:lvl5pPr marL="1828800" algn="l" defTabSz="914400" rtl="0" eaLnBrk="1" latinLnBrk="0" hangingPunct="1">
+      <a:defRPr sz="1200" kern="1200">
+        <a:solidFill>
+          <a:schemeClr val="tx1"/>
+        </a:solidFill>
+        <a:latin typeface="+mn-lt"/>
+        <a:ea typeface="+mn-ea"/>
+        <a:cs typeface="+mn-cs"/>
+      </a:defRPr>
+    </a:lvl5pPr>
+    <a:lvl6pPr marL="2286000" algn="l" defTabSz="914400" rtl="0" eaLnBrk="1" latinLnBrk="0" hangingPunct="1">
+      <a:defRPr sz="1200" kern="1200">
+        <a:solidFill>
+          <a:schemeClr val="tx1"/>
+        </a:solidFill>
+        <a:latin typeface="+mn-lt"/>
+        <a:ea typeface="+mn-ea"/>
+        <a:cs typeface="+mn-cs"/>
+      </a:defRPr>
+    </a:lvl6pPr>
+    <a:lvl7pPr marL="2743200" algn="l" defTabSz="914400" rtl="0" eaLnBrk="1" latinLnBrk="0" hangingPunct="1">
+      <a:defRPr sz="1200" kern="1200">
+        <a:solidFill>
+          <a:schemeClr val="tx1"/>
+        </a:solidFill>
+        <a:latin typeface="+mn-lt"/>
+        <a:ea typeface="+mn-ea"/>
+        <a:cs typeface="+mn-cs"/>
+      </a:defRPr>
+    </a:lvl7pPr>
+    <a:lvl8pPr marL="3200400" algn="l" defTabSz="914400" rtl="0" eaLnBrk="1" latinLnBrk="0" hangingPunct="1">
+      <a:defRPr sz="1200" kern="1200">
+        <a:solidFill>
+          <a:schemeClr val="tx1"/>
+        </a:solidFill>
+        <a:latin typeface="+mn-lt"/>
+        <a:ea typeface="+mn-ea"/>
+        <a:cs typeface="+mn-cs"/>
+      </a:defRPr>
+    </a:lvl8pPr>
+    <a:lvl9pPr marL="3657600" algn="l" defTabSz="914400" rtl="0" eaLnBrk="1" latinLnBrk="0" hangingPunct="1">
+      <a:defRPr sz="1200" kern="1200">
+        <a:solidFill>
+          <a:schemeClr val="tx1"/>
+        </a:solidFill>
+        <a:latin typeface="+mn-lt"/>
+        <a:ea typeface="+mn-ea"/>
+        <a:cs typeface="+mn-cs"/>
+      </a:defRPr>
+    </a:lvl9pPr>
+  </p:notesStyle>
+</p:notesMaster>
+</file>
+
+<file path=ppt/notesSlides/notesSlide1.xml><?xml version="1.0" encoding="utf-8"?>
+<p:notes xmlns:a="http://schemas.openxmlformats.org/drawingml/2006/main" xmlns:r="http://schemas.openxmlformats.org/officeDocument/2006/relationships" xmlns:p="http://schemas.openxmlformats.org/presentationml/2006/main">
+  <p:cSld>
+    <p:spTree>
+      <p:nvGrpSpPr>
+        <p:cNvPr id="1" name=""/>
+        <p:cNvGrpSpPr/>
+        <p:nvPr/>
+      </p:nvGrpSpPr>
+      <p:grpSpPr>
+        <a:xfrm>
+          <a:off x="0" y="0"/>
+          <a:ext cx="0" cy="0"/>
+          <a:chOff x="0" y="0"/>
+          <a:chExt cx="0" cy="0"/>
+        </a:xfrm>
+      </p:grpSpPr>
+      <p:sp>
+        <p:nvSpPr>
+          <p:cNvPr id="2" name="Slide Image Placeholder 1"/>
+          <p:cNvSpPr>
+            <a:spLocks noGrp="1" noRot="1" noChangeAspect="1"/>
+          </p:cNvSpPr>
+          <p:nvPr>
+            <p:ph type="sldImg"/>
+          </p:nvPr>
+        </p:nvSpPr>
+        <p:spPr/>
+      </p:sp>
+      <p:sp>
+        <p:nvSpPr>
+          <p:cNvPr id="3" name="Notes Placeholder 2"/>
+          <p:cNvSpPr>
+            <a:spLocks noGrp="1"/>
+          </p:cNvSpPr>
+          <p:nvPr>
+            <p:ph type="body" idx="1"/>
+          </p:nvPr>
+        </p:nvSpPr>
+        <p:spPr/>
+        <p:txBody>
+          <a:bodyPr/>
+          <a:lstStyle/>
+          <a:p>
+            <a:pPr marL="0" marR="0">
+              <a:lnSpc>
+                <a:spcPct val="107000"/>
+              </a:lnSpc>
+              <a:spcBef>
+                <a:spcPts val="0"/>
+              </a:spcBef>
+              <a:spcAft>
+                <a:spcPts val="800"/>
+              </a:spcAft>
+            </a:pPr>
+            <a:r>
+              <a:rPr lang="en-US" sz="1800" b="1" kern="1800" dirty="0">
+                <a:solidFill>
+                  <a:srgbClr val="000000"/>
+                </a:solidFill>
+                <a:effectLst/>
+                <a:latin typeface="Segoe UI" panose="020B0502040204020203" pitchFamily="34" charset="0"/>
+                <a:ea typeface="Times New Roman" panose="02020603050405020304" pitchFamily="18" charset="0"/>
+                <a:cs typeface="Times New Roman" panose="02020603050405020304" pitchFamily="18" charset="0"/>
+              </a:rPr>
+              <a:t>Data exploration and cleanup</a:t>
+            </a:r>
+            <a:endParaRPr lang="en-US" sz="1800" kern="100" dirty="0">
+              <a:effectLst/>
+              <a:latin typeface="Calibri" panose="020F0502020204030204" pitchFamily="34" charset="0"/>
+              <a:ea typeface="Calibri" panose="020F0502020204030204" pitchFamily="34" charset="0"/>
+              <a:cs typeface="Times New Roman" panose="02020603050405020304" pitchFamily="18" charset="0"/>
+            </a:endParaRPr>
+          </a:p>
+          <a:p>
+            <a:pPr marL="342900" marR="0" lvl="0" indent="-342900">
+              <a:spcBef>
+                <a:spcPts val="0"/>
+              </a:spcBef>
+              <a:spcAft>
+                <a:spcPts val="1200"/>
+              </a:spcAft>
+              <a:buSzPts val="1000"/>
+              <a:buFont typeface="Symbol" panose="05050102010706020507" pitchFamily="18" charset="2"/>
+              <a:buChar char=""/>
+              <a:tabLst>
+                <a:tab pos="457200" algn="l"/>
+              </a:tabLst>
+            </a:pPr>
+            <a:r>
+              <a:rPr lang="en-US" sz="1800" dirty="0">
+                <a:solidFill>
+                  <a:srgbClr val="000000"/>
+                </a:solidFill>
+                <a:effectLst/>
+                <a:latin typeface="Segoe UI" panose="020B0502040204020203" pitchFamily="34" charset="0"/>
+                <a:ea typeface="Times New Roman" panose="02020603050405020304" pitchFamily="18" charset="0"/>
+              </a:rPr>
+              <a:t>The data for this study was taken from various sources which are listed in the citations section of this presentation if you are interested.</a:t>
+            </a:r>
+            <a:endParaRPr lang="en-US" sz="1800" dirty="0">
+              <a:effectLst/>
+              <a:latin typeface="Times New Roman" panose="02020603050405020304" pitchFamily="18" charset="0"/>
+              <a:ea typeface="Times New Roman" panose="02020603050405020304" pitchFamily="18" charset="0"/>
+            </a:endParaRPr>
+          </a:p>
+          <a:p>
+            <a:pPr marL="342900" marR="0" lvl="0" indent="-342900">
+              <a:spcBef>
+                <a:spcPts val="0"/>
+              </a:spcBef>
+              <a:spcAft>
+                <a:spcPts val="1200"/>
+              </a:spcAft>
+              <a:buSzPts val="1000"/>
+              <a:buFont typeface="Symbol" panose="05050102010706020507" pitchFamily="18" charset="2"/>
+              <a:buChar char=""/>
+              <a:tabLst>
+                <a:tab pos="457200" algn="l"/>
+              </a:tabLst>
+            </a:pPr>
+            <a:r>
+              <a:rPr lang="en-US" sz="1800" dirty="0">
+                <a:solidFill>
+                  <a:srgbClr val="000000"/>
+                </a:solidFill>
+                <a:effectLst/>
+                <a:latin typeface="Segoe UI" panose="020B0502040204020203" pitchFamily="34" charset="0"/>
+                <a:ea typeface="Times New Roman" panose="02020603050405020304" pitchFamily="18" charset="0"/>
+              </a:rPr>
+              <a:t>The data for the next few slides was downloaded as excel files, converted to csv and read in for manipulation and cleanup.</a:t>
+            </a:r>
+            <a:endParaRPr lang="en-US" sz="1800" dirty="0">
+              <a:effectLst/>
+              <a:latin typeface="Times New Roman" panose="02020603050405020304" pitchFamily="18" charset="0"/>
+              <a:ea typeface="Times New Roman" panose="02020603050405020304" pitchFamily="18" charset="0"/>
+            </a:endParaRPr>
+          </a:p>
+          <a:p>
+            <a:endParaRPr lang="en-US" dirty="0"/>
+          </a:p>
+        </p:txBody>
+      </p:sp>
+      <p:sp>
+        <p:nvSpPr>
+          <p:cNvPr id="4" name="Slide Number Placeholder 3"/>
+          <p:cNvSpPr>
+            <a:spLocks noGrp="1"/>
+          </p:cNvSpPr>
+          <p:nvPr>
+            <p:ph type="sldNum" sz="quarter" idx="5"/>
+          </p:nvPr>
+        </p:nvSpPr>
+        <p:spPr/>
+        <p:txBody>
+          <a:bodyPr/>
+          <a:lstStyle/>
+          <a:p>
+            <a:fld id="{95646C1A-F1D7-49BA-A1FF-7E74335FB05C}" type="slidenum">
+              <a:rPr lang="en-US" smtClean="0"/>
+              <a:t>1</a:t>
+            </a:fld>
+            <a:endParaRPr lang="en-US"/>
+          </a:p>
+        </p:txBody>
+      </p:sp>
+    </p:spTree>
+    <p:extLst>
+      <p:ext uri="{BB962C8B-B14F-4D97-AF65-F5344CB8AC3E}">
+        <p14:creationId xmlns:p14="http://schemas.microsoft.com/office/powerpoint/2010/main" val="1349558872"/>
+      </p:ext>
+    </p:extLst>
+  </p:cSld>
+  <p:clrMapOvr>
+    <a:masterClrMapping/>
+  </p:clrMapOvr>
+</p:notes>
+</file>
+
+<file path=ppt/notesSlides/notesSlide2.xml><?xml version="1.0" encoding="utf-8"?>
+<p:notes xmlns:a="http://schemas.openxmlformats.org/drawingml/2006/main" xmlns:r="http://schemas.openxmlformats.org/officeDocument/2006/relationships" xmlns:p="http://schemas.openxmlformats.org/presentationml/2006/main">
+  <p:cSld>
+    <p:spTree>
+      <p:nvGrpSpPr>
+        <p:cNvPr id="1" name=""/>
+        <p:cNvGrpSpPr/>
+        <p:nvPr/>
+      </p:nvGrpSpPr>
+      <p:grpSpPr>
+        <a:xfrm>
+          <a:off x="0" y="0"/>
+          <a:ext cx="0" cy="0"/>
+          <a:chOff x="0" y="0"/>
+          <a:chExt cx="0" cy="0"/>
+        </a:xfrm>
+      </p:grpSpPr>
+      <p:sp>
+        <p:nvSpPr>
+          <p:cNvPr id="2" name="Slide Image Placeholder 1"/>
+          <p:cNvSpPr>
+            <a:spLocks noGrp="1" noRot="1" noChangeAspect="1"/>
+          </p:cNvSpPr>
+          <p:nvPr>
+            <p:ph type="sldImg"/>
+          </p:nvPr>
+        </p:nvSpPr>
+        <p:spPr/>
+      </p:sp>
+      <p:sp>
+        <p:nvSpPr>
+          <p:cNvPr id="3" name="Notes Placeholder 2"/>
+          <p:cNvSpPr>
+            <a:spLocks noGrp="1"/>
+          </p:cNvSpPr>
+          <p:nvPr>
+            <p:ph type="body" idx="1"/>
+          </p:nvPr>
+        </p:nvSpPr>
+        <p:spPr/>
+        <p:txBody>
+          <a:bodyPr/>
+          <a:lstStyle/>
+          <a:p>
+            <a:pPr marL="171450" indent="-171450">
+              <a:buFont typeface="Arial" panose="020B0604020202020204" pitchFamily="34" charset="0"/>
+              <a:buChar char="•"/>
+            </a:pPr>
+            <a:r>
+              <a:rPr lang="en-US" dirty="0"/>
+              <a:t>You’ll see the horizontal lines mark some events that occurred during the pandemic that may have had an effect on sales volume.</a:t>
+            </a:r>
+          </a:p>
+          <a:p>
+            <a:pPr marL="171450" indent="-171450">
+              <a:buFont typeface="Arial" panose="020B0604020202020204" pitchFamily="34" charset="0"/>
+              <a:buChar char="•"/>
+            </a:pPr>
+            <a:r>
+              <a:rPr lang="en-US" dirty="0"/>
+              <a:t>Overall, we saw a 20% decline in total units sold during this 3 year period.</a:t>
+            </a:r>
+          </a:p>
+          <a:p>
+            <a:pPr marL="171450" marR="0" lvl="0" indent="-171450" algn="l" defTabSz="914400" rtl="0" eaLnBrk="1" fontAlgn="auto" latinLnBrk="0" hangingPunct="1">
+              <a:lnSpc>
+                <a:spcPct val="100000"/>
+              </a:lnSpc>
+              <a:spcBef>
+                <a:spcPts val="0"/>
+              </a:spcBef>
+              <a:spcAft>
+                <a:spcPts val="0"/>
+              </a:spcAft>
+              <a:buClrTx/>
+              <a:buSzTx/>
+              <a:buFont typeface="Arial" panose="020B0604020202020204" pitchFamily="34" charset="0"/>
+              <a:buChar char="•"/>
+              <a:tabLst/>
+              <a:defRPr/>
+            </a:pPr>
+            <a:r>
+              <a:rPr lang="en-US" dirty="0"/>
+              <a:t>Its interesting to note, </a:t>
+            </a:r>
+            <a:r>
+              <a:rPr lang="en-US" sz="1800" kern="0" dirty="0">
+                <a:solidFill>
+                  <a:srgbClr val="000000"/>
+                </a:solidFill>
+                <a:effectLst/>
+                <a:latin typeface="Segoe UI" panose="020B0502040204020203" pitchFamily="34" charset="0"/>
+                <a:ea typeface="Times New Roman" panose="02020603050405020304" pitchFamily="18" charset="0"/>
+                <a:cs typeface="Times New Roman" panose="02020603050405020304" pitchFamily="18" charset="0"/>
+              </a:rPr>
+              <a:t>that while total sales volume in the form of "units sold" had an initial drastic decline which happened at the beginning of the pandemic and once lockdowns where instated, it rebounded very rapidly back to pre-pandemic levels. </a:t>
+            </a:r>
+          </a:p>
+          <a:p>
+            <a:pPr marL="171450" marR="0" lvl="0" indent="-171450" algn="l" defTabSz="914400" rtl="0" eaLnBrk="1" fontAlgn="auto" latinLnBrk="0" hangingPunct="1">
+              <a:lnSpc>
+                <a:spcPct val="100000"/>
+              </a:lnSpc>
+              <a:spcBef>
+                <a:spcPts val="0"/>
+              </a:spcBef>
+              <a:spcAft>
+                <a:spcPts val="0"/>
+              </a:spcAft>
+              <a:buClrTx/>
+              <a:buSzTx/>
+              <a:buFont typeface="Arial" panose="020B0604020202020204" pitchFamily="34" charset="0"/>
+              <a:buChar char="•"/>
+              <a:tabLst/>
+              <a:defRPr/>
+            </a:pPr>
+            <a:r>
+              <a:rPr lang="en-US" sz="1800" kern="0" dirty="0">
+                <a:solidFill>
+                  <a:srgbClr val="000000"/>
+                </a:solidFill>
+                <a:effectLst/>
+                <a:latin typeface="Segoe UI" panose="020B0502040204020203" pitchFamily="34" charset="0"/>
+                <a:ea typeface="Calibri" panose="020F0502020204030204" pitchFamily="34" charset="0"/>
+                <a:cs typeface="Times New Roman" panose="02020603050405020304" pitchFamily="18" charset="0"/>
+              </a:rPr>
+              <a:t>Why is that? Dustin has some thoughts on that in the later slides.</a:t>
+            </a:r>
+          </a:p>
+          <a:p>
+            <a:pPr marL="171450" marR="0" lvl="0" indent="-171450" algn="l" defTabSz="914400" rtl="0" eaLnBrk="1" fontAlgn="auto" latinLnBrk="0" hangingPunct="1">
+              <a:lnSpc>
+                <a:spcPct val="100000"/>
+              </a:lnSpc>
+              <a:spcBef>
+                <a:spcPts val="0"/>
+              </a:spcBef>
+              <a:spcAft>
+                <a:spcPts val="0"/>
+              </a:spcAft>
+              <a:buClrTx/>
+              <a:buSzTx/>
+              <a:buFont typeface="Arial" panose="020B0604020202020204" pitchFamily="34" charset="0"/>
+              <a:buChar char="•"/>
+              <a:tabLst/>
+              <a:defRPr/>
+            </a:pPr>
+            <a:r>
+              <a:rPr lang="en-US" sz="1800" kern="0" dirty="0">
+                <a:solidFill>
+                  <a:srgbClr val="000000"/>
+                </a:solidFill>
+                <a:effectLst/>
+                <a:latin typeface="Segoe UI" panose="020B0502040204020203" pitchFamily="34" charset="0"/>
+                <a:ea typeface="Calibri" panose="020F0502020204030204" pitchFamily="34" charset="0"/>
+                <a:cs typeface="Times New Roman" panose="02020603050405020304" pitchFamily="18" charset="0"/>
+              </a:rPr>
+              <a:t>You also notice that </a:t>
+            </a:r>
+            <a:r>
+              <a:rPr lang="en-US" sz="1800" kern="0" dirty="0">
+                <a:effectLst/>
+                <a:latin typeface="Segoe UI" panose="020B0502040204020203" pitchFamily="34" charset="0"/>
+                <a:ea typeface="Times New Roman" panose="02020603050405020304" pitchFamily="18" charset="0"/>
+              </a:rPr>
+              <a:t>starting in April of 2021, over a year since the pandemic began, the total number of units sold decreases, while the total revenue on those sales increased substantially. </a:t>
+            </a:r>
+          </a:p>
+          <a:p>
+            <a:pPr marL="342900" marR="0" lvl="0" indent="-342900">
+              <a:lnSpc>
+                <a:spcPct val="107000"/>
+              </a:lnSpc>
+              <a:spcBef>
+                <a:spcPts val="0"/>
+              </a:spcBef>
+              <a:spcAft>
+                <a:spcPts val="800"/>
+              </a:spcAft>
+              <a:buSzPts val="1000"/>
+              <a:buFont typeface="Symbol" panose="05050102010706020507" pitchFamily="18" charset="2"/>
+              <a:buChar char=""/>
+              <a:tabLst>
+                <a:tab pos="457200" algn="l"/>
+              </a:tabLst>
+            </a:pPr>
+            <a:r>
+              <a:rPr lang="en-US" sz="1800" kern="0" dirty="0">
+                <a:solidFill>
+                  <a:srgbClr val="000000"/>
+                </a:solidFill>
+                <a:effectLst/>
+                <a:latin typeface="Segoe UI" panose="020B0502040204020203" pitchFamily="34" charset="0"/>
+                <a:ea typeface="Times New Roman" panose="02020603050405020304" pitchFamily="18" charset="0"/>
+                <a:cs typeface="Times New Roman" panose="02020603050405020304" pitchFamily="18" charset="0"/>
+              </a:rPr>
+              <a:t>In Nov of 2020 there were almost 17M units sold that generated about 9 billion dollars in revenue.</a:t>
+            </a:r>
+            <a:endParaRPr lang="en-US" sz="1800" kern="100" dirty="0">
+              <a:effectLst/>
+              <a:latin typeface="Calibri" panose="020F0502020204030204" pitchFamily="34" charset="0"/>
+              <a:ea typeface="Calibri" panose="020F0502020204030204" pitchFamily="34" charset="0"/>
+              <a:cs typeface="Times New Roman" panose="02020603050405020304" pitchFamily="18" charset="0"/>
+            </a:endParaRPr>
+          </a:p>
+          <a:p>
+            <a:pPr marL="342900" marR="0" lvl="0" indent="-342900">
+              <a:lnSpc>
+                <a:spcPct val="107000"/>
+              </a:lnSpc>
+              <a:spcBef>
+                <a:spcPts val="0"/>
+              </a:spcBef>
+              <a:spcAft>
+                <a:spcPts val="800"/>
+              </a:spcAft>
+              <a:buSzPts val="1000"/>
+              <a:buFont typeface="Symbol" panose="05050102010706020507" pitchFamily="18" charset="2"/>
+              <a:buChar char=""/>
+              <a:tabLst>
+                <a:tab pos="457200" algn="l"/>
+              </a:tabLst>
+            </a:pPr>
+            <a:r>
+              <a:rPr lang="en-US" sz="1800" kern="0" dirty="0">
+                <a:solidFill>
+                  <a:srgbClr val="000000"/>
+                </a:solidFill>
+                <a:effectLst/>
+                <a:latin typeface="Segoe UI" panose="020B0502040204020203" pitchFamily="34" charset="0"/>
+                <a:ea typeface="Times New Roman" panose="02020603050405020304" pitchFamily="18" charset="0"/>
+                <a:cs typeface="Times New Roman" panose="02020603050405020304" pitchFamily="18" charset="0"/>
+              </a:rPr>
+              <a:t>From Nov 2020 to April 2021, Units sold remained relatively stable and flat while revenue soared to near 17 billion dollars on the same volume of cars sold. Why is that?</a:t>
+            </a:r>
+            <a:endParaRPr lang="en-US" sz="1800" kern="100" dirty="0">
+              <a:effectLst/>
+              <a:latin typeface="Calibri" panose="020F0502020204030204" pitchFamily="34" charset="0"/>
+              <a:ea typeface="Calibri" panose="020F0502020204030204" pitchFamily="34" charset="0"/>
+              <a:cs typeface="Times New Roman" panose="02020603050405020304" pitchFamily="18" charset="0"/>
+            </a:endParaRPr>
+          </a:p>
+          <a:p>
+            <a:pPr marL="171450" marR="0" lvl="0" indent="-171450" algn="l" defTabSz="914400" rtl="0" eaLnBrk="1" fontAlgn="auto" latinLnBrk="0" hangingPunct="1">
+              <a:lnSpc>
+                <a:spcPct val="100000"/>
+              </a:lnSpc>
+              <a:spcBef>
+                <a:spcPts val="0"/>
+              </a:spcBef>
+              <a:spcAft>
+                <a:spcPts val="0"/>
+              </a:spcAft>
+              <a:buClrTx/>
+              <a:buSzTx/>
+              <a:buFont typeface="Arial" panose="020B0604020202020204" pitchFamily="34" charset="0"/>
+              <a:buChar char="•"/>
+              <a:tabLst/>
+              <a:defRPr/>
+            </a:pPr>
+            <a:endParaRPr lang="en-US" sz="1800" kern="100" dirty="0">
+              <a:effectLst/>
+              <a:latin typeface="Calibri" panose="020F0502020204030204" pitchFamily="34" charset="0"/>
+              <a:ea typeface="Calibri" panose="020F0502020204030204" pitchFamily="34" charset="0"/>
+              <a:cs typeface="Times New Roman" panose="02020603050405020304" pitchFamily="18" charset="0"/>
+            </a:endParaRPr>
+          </a:p>
+          <a:p>
+            <a:pPr marL="171450" indent="-171450">
+              <a:buFont typeface="Arial" panose="020B0604020202020204" pitchFamily="34" charset="0"/>
+              <a:buChar char="•"/>
+            </a:pPr>
+            <a:endParaRPr lang="en-US" dirty="0"/>
+          </a:p>
+        </p:txBody>
+      </p:sp>
+      <p:sp>
+        <p:nvSpPr>
+          <p:cNvPr id="4" name="Slide Number Placeholder 3"/>
+          <p:cNvSpPr>
+            <a:spLocks noGrp="1"/>
+          </p:cNvSpPr>
+          <p:nvPr>
+            <p:ph type="sldNum" sz="quarter" idx="5"/>
+          </p:nvPr>
+        </p:nvSpPr>
+        <p:spPr/>
+        <p:txBody>
+          <a:bodyPr/>
+          <a:lstStyle/>
+          <a:p>
+            <a:fld id="{95646C1A-F1D7-49BA-A1FF-7E74335FB05C}" type="slidenum">
+              <a:rPr lang="en-US" smtClean="0"/>
+              <a:t>2</a:t>
+            </a:fld>
+            <a:endParaRPr lang="en-US"/>
+          </a:p>
+        </p:txBody>
+      </p:sp>
+    </p:spTree>
+    <p:extLst>
+      <p:ext uri="{BB962C8B-B14F-4D97-AF65-F5344CB8AC3E}">
+        <p14:creationId xmlns:p14="http://schemas.microsoft.com/office/powerpoint/2010/main" val="172446688"/>
+      </p:ext>
+    </p:extLst>
+  </p:cSld>
+  <p:clrMapOvr>
+    <a:masterClrMapping/>
+  </p:clrMapOvr>
+</p:notes>
+</file>
+
+<file path=ppt/notesSlides/notesSlide3.xml><?xml version="1.0" encoding="utf-8"?>
+<p:notes xmlns:a="http://schemas.openxmlformats.org/drawingml/2006/main" xmlns:r="http://schemas.openxmlformats.org/officeDocument/2006/relationships" xmlns:p="http://schemas.openxmlformats.org/presentationml/2006/main">
+  <p:cSld>
+    <p:spTree>
+      <p:nvGrpSpPr>
+        <p:cNvPr id="1" name=""/>
+        <p:cNvGrpSpPr/>
+        <p:nvPr/>
+      </p:nvGrpSpPr>
+      <p:grpSpPr>
+        <a:xfrm>
+          <a:off x="0" y="0"/>
+          <a:ext cx="0" cy="0"/>
+          <a:chOff x="0" y="0"/>
+          <a:chExt cx="0" cy="0"/>
+        </a:xfrm>
+      </p:grpSpPr>
+      <p:sp>
+        <p:nvSpPr>
+          <p:cNvPr id="2" name="Slide Image Placeholder 1"/>
+          <p:cNvSpPr>
+            <a:spLocks noGrp="1" noRot="1" noChangeAspect="1"/>
+          </p:cNvSpPr>
+          <p:nvPr>
+            <p:ph type="sldImg"/>
+          </p:nvPr>
+        </p:nvSpPr>
+        <p:spPr/>
+      </p:sp>
+      <p:sp>
+        <p:nvSpPr>
+          <p:cNvPr id="3" name="Notes Placeholder 2"/>
+          <p:cNvSpPr>
+            <a:spLocks noGrp="1"/>
+          </p:cNvSpPr>
+          <p:nvPr>
+            <p:ph type="body" idx="1"/>
+          </p:nvPr>
+        </p:nvSpPr>
+        <p:spPr/>
+        <p:txBody>
+          <a:bodyPr/>
+          <a:lstStyle/>
+          <a:p>
+            <a:pPr marL="0" marR="0">
+              <a:lnSpc>
+                <a:spcPct val="107000"/>
+              </a:lnSpc>
+              <a:spcBef>
+                <a:spcPts val="0"/>
+              </a:spcBef>
+              <a:spcAft>
+                <a:spcPts val="800"/>
+              </a:spcAft>
+            </a:pPr>
+            <a:r>
+              <a:rPr lang="en-US" sz="1800" b="1" kern="0" dirty="0">
+                <a:solidFill>
+                  <a:srgbClr val="000000"/>
+                </a:solidFill>
+                <a:effectLst/>
+                <a:latin typeface="Segoe UI" panose="020B0502040204020203" pitchFamily="34" charset="0"/>
+                <a:ea typeface="Times New Roman" panose="02020603050405020304" pitchFamily="18" charset="0"/>
+                <a:cs typeface="Times New Roman" panose="02020603050405020304" pitchFamily="18" charset="0"/>
+              </a:rPr>
+              <a:t>CPI INDEX:</a:t>
+            </a:r>
+            <a:endParaRPr lang="en-US" sz="1800" kern="100" dirty="0">
+              <a:effectLst/>
+              <a:latin typeface="Calibri" panose="020F0502020204030204" pitchFamily="34" charset="0"/>
+              <a:ea typeface="Calibri" panose="020F0502020204030204" pitchFamily="34" charset="0"/>
+              <a:cs typeface="Times New Roman" panose="02020603050405020304" pitchFamily="18" charset="0"/>
+            </a:endParaRPr>
+          </a:p>
+          <a:p>
+            <a:pPr marL="342900" marR="0" lvl="0" indent="-342900">
+              <a:lnSpc>
+                <a:spcPct val="107000"/>
+              </a:lnSpc>
+              <a:spcBef>
+                <a:spcPts val="0"/>
+              </a:spcBef>
+              <a:spcAft>
+                <a:spcPts val="0"/>
+              </a:spcAft>
+              <a:buFont typeface="Symbol" panose="05050102010706020507" pitchFamily="18" charset="2"/>
+              <a:buChar char=""/>
+            </a:pPr>
+            <a:r>
+              <a:rPr lang="en-US" sz="1800" kern="0" dirty="0">
+                <a:solidFill>
+                  <a:srgbClr val="000000"/>
+                </a:solidFill>
+                <a:effectLst/>
+                <a:latin typeface="Segoe UI" panose="020B0502040204020203" pitchFamily="34" charset="0"/>
+                <a:ea typeface="Times New Roman" panose="02020603050405020304" pitchFamily="18" charset="0"/>
+                <a:cs typeface="Times New Roman" panose="02020603050405020304" pitchFamily="18" charset="0"/>
+              </a:rPr>
+              <a:t>The CPI index gives us an idea. </a:t>
+            </a:r>
+            <a:endParaRPr lang="en-US" sz="1800" kern="100" dirty="0">
+              <a:effectLst/>
+              <a:latin typeface="Calibri" panose="020F0502020204030204" pitchFamily="34" charset="0"/>
+              <a:ea typeface="Calibri" panose="020F0502020204030204" pitchFamily="34" charset="0"/>
+              <a:cs typeface="Times New Roman" panose="02020603050405020304" pitchFamily="18" charset="0"/>
+            </a:endParaRPr>
+          </a:p>
+          <a:p>
+            <a:pPr marL="342900" marR="0" lvl="0" indent="-342900">
+              <a:lnSpc>
+                <a:spcPct val="107000"/>
+              </a:lnSpc>
+              <a:spcBef>
+                <a:spcPts val="0"/>
+              </a:spcBef>
+              <a:spcAft>
+                <a:spcPts val="0"/>
+              </a:spcAft>
+              <a:buFont typeface="Symbol" panose="05050102010706020507" pitchFamily="18" charset="2"/>
+              <a:buChar char=""/>
+            </a:pPr>
+            <a:r>
+              <a:rPr lang="en-US" sz="1800" kern="0" dirty="0">
+                <a:solidFill>
+                  <a:srgbClr val="000000"/>
+                </a:solidFill>
+                <a:effectLst/>
+                <a:latin typeface="Segoe UI" panose="020B0502040204020203" pitchFamily="34" charset="0"/>
+                <a:ea typeface="Times New Roman" panose="02020603050405020304" pitchFamily="18" charset="0"/>
+                <a:cs typeface="Times New Roman" panose="02020603050405020304" pitchFamily="18" charset="0"/>
+              </a:rPr>
+              <a:t>The Consumer Price Index is a measure of the average change over time in the prices paid by consumers for a market basket of consumer goods and services.</a:t>
+            </a:r>
+            <a:endParaRPr lang="en-US" sz="1800" kern="100" dirty="0">
+              <a:effectLst/>
+              <a:latin typeface="Calibri" panose="020F0502020204030204" pitchFamily="34" charset="0"/>
+              <a:ea typeface="Calibri" panose="020F0502020204030204" pitchFamily="34" charset="0"/>
+              <a:cs typeface="Times New Roman" panose="02020603050405020304" pitchFamily="18" charset="0"/>
+            </a:endParaRPr>
+          </a:p>
+          <a:p>
+            <a:pPr marL="342900" marR="0" lvl="0" indent="-342900">
+              <a:lnSpc>
+                <a:spcPct val="107000"/>
+              </a:lnSpc>
+              <a:spcBef>
+                <a:spcPts val="0"/>
+              </a:spcBef>
+              <a:spcAft>
+                <a:spcPts val="800"/>
+              </a:spcAft>
+              <a:buFont typeface="Symbol" panose="05050102010706020507" pitchFamily="18" charset="2"/>
+              <a:buChar char=""/>
+            </a:pPr>
+            <a:r>
+              <a:rPr lang="en-US" sz="1800" kern="0" dirty="0">
+                <a:solidFill>
+                  <a:srgbClr val="000000"/>
+                </a:solidFill>
+                <a:effectLst/>
+                <a:latin typeface="Segoe UI" panose="020B0502040204020203" pitchFamily="34" charset="0"/>
+                <a:ea typeface="Times New Roman" panose="02020603050405020304" pitchFamily="18" charset="0"/>
+                <a:cs typeface="Times New Roman" panose="02020603050405020304" pitchFamily="18" charset="0"/>
+              </a:rPr>
+              <a:t>In English, it means: It measures weather or not cost of goods is going up or down.</a:t>
+            </a:r>
+            <a:endParaRPr lang="en-US" sz="1800" kern="100" dirty="0">
+              <a:effectLst/>
+              <a:latin typeface="Calibri" panose="020F0502020204030204" pitchFamily="34" charset="0"/>
+              <a:ea typeface="Calibri" panose="020F0502020204030204" pitchFamily="34" charset="0"/>
+              <a:cs typeface="Times New Roman" panose="02020603050405020304" pitchFamily="18" charset="0"/>
+            </a:endParaRPr>
+          </a:p>
+          <a:p>
+            <a:pPr marL="342900" marR="0" lvl="0" indent="-342900">
+              <a:lnSpc>
+                <a:spcPct val="107000"/>
+              </a:lnSpc>
+              <a:spcBef>
+                <a:spcPts val="0"/>
+              </a:spcBef>
+              <a:spcAft>
+                <a:spcPts val="800"/>
+              </a:spcAft>
+              <a:buSzPts val="1000"/>
+              <a:buFont typeface="Symbol" panose="05050102010706020507" pitchFamily="18" charset="2"/>
+              <a:buChar char=""/>
+              <a:tabLst>
+                <a:tab pos="457200" algn="l"/>
+              </a:tabLst>
+            </a:pPr>
+            <a:r>
+              <a:rPr lang="en-US" sz="1800" kern="100" dirty="0">
+                <a:solidFill>
+                  <a:srgbClr val="000000"/>
+                </a:solidFill>
+                <a:effectLst/>
+                <a:latin typeface="Segoe UI" panose="020B0502040204020203" pitchFamily="34" charset="0"/>
+                <a:ea typeface="Calibri" panose="020F0502020204030204" pitchFamily="34" charset="0"/>
+                <a:cs typeface="Times New Roman" panose="02020603050405020304" pitchFamily="18" charset="0"/>
+              </a:rPr>
+              <a:t>Around this same time the CPI index rose dramatically, and dealer inventory levels fell off the map, which Dustin will show you shortly. Was this all due to Covid-19? That is difficult to say with 100% certainty as there are many variables at play.</a:t>
+            </a:r>
+            <a:r>
+              <a:rPr lang="en-US" sz="1800" kern="100" dirty="0">
+                <a:solidFill>
+                  <a:srgbClr val="000000"/>
+                </a:solidFill>
+                <a:effectLst/>
+                <a:latin typeface="Calibri" panose="020F0502020204030204" pitchFamily="34" charset="0"/>
+                <a:ea typeface="Calibri" panose="020F0502020204030204" pitchFamily="34" charset="0"/>
+                <a:cs typeface="Times New Roman" panose="02020603050405020304" pitchFamily="18" charset="0"/>
+              </a:rPr>
+              <a:t> But I think you’ll see in the upcoming data </a:t>
+            </a:r>
+            <a:r>
+              <a:rPr lang="en-US" sz="1800" kern="0" dirty="0">
+                <a:solidFill>
+                  <a:srgbClr val="000000"/>
+                </a:solidFill>
+                <a:effectLst/>
+                <a:latin typeface="var(--jp-content-font-family)"/>
+                <a:ea typeface="Times New Roman" panose="02020603050405020304" pitchFamily="18" charset="0"/>
+                <a:cs typeface="Segoe UI" panose="020B0502040204020203" pitchFamily="34" charset="0"/>
+              </a:rPr>
+              <a:t>that while Covid-19 itself may not have effected vehicle sales, the response to it in the form of regulations (Chip shortage) and  stimulus checks  (Cares and Heals Acts) played a key role in values and overall inflation soaring, as seen in the Consumer Price Index (CPI).</a:t>
+            </a:r>
+            <a:endParaRPr lang="en-US" sz="1800" kern="100" dirty="0">
+              <a:solidFill>
+                <a:srgbClr val="000000"/>
+              </a:solidFill>
+              <a:effectLst/>
+              <a:latin typeface="Calibri" panose="020F0502020204030204" pitchFamily="34" charset="0"/>
+              <a:ea typeface="Calibri" panose="020F0502020204030204" pitchFamily="34" charset="0"/>
+              <a:cs typeface="Times New Roman" panose="02020603050405020304" pitchFamily="18" charset="0"/>
+            </a:endParaRPr>
+          </a:p>
+          <a:p>
+            <a:pPr marL="342900" marR="0" lvl="0" indent="-342900">
+              <a:lnSpc>
+                <a:spcPct val="107000"/>
+              </a:lnSpc>
+              <a:spcBef>
+                <a:spcPts val="0"/>
+              </a:spcBef>
+              <a:spcAft>
+                <a:spcPts val="800"/>
+              </a:spcAft>
+              <a:buFont typeface="Symbol" panose="05050102010706020507" pitchFamily="18" charset="2"/>
+              <a:buChar char=""/>
+            </a:pPr>
+            <a:r>
+              <a:rPr lang="en-US" sz="1800" b="1" kern="0" dirty="0">
+                <a:effectLst/>
+                <a:latin typeface="Segoe UI" panose="020B0502040204020203" pitchFamily="34" charset="0"/>
+                <a:ea typeface="Times New Roman" panose="02020603050405020304" pitchFamily="18" charset="0"/>
+                <a:cs typeface="Times New Roman" panose="02020603050405020304" pitchFamily="18" charset="0"/>
+              </a:rPr>
+              <a:t> </a:t>
+            </a:r>
+            <a:endParaRPr lang="en-US" sz="1800" kern="100" dirty="0">
+              <a:effectLst/>
+              <a:latin typeface="Calibri" panose="020F0502020204030204" pitchFamily="34" charset="0"/>
+              <a:ea typeface="Calibri" panose="020F0502020204030204" pitchFamily="34" charset="0"/>
+              <a:cs typeface="Times New Roman" panose="02020603050405020304" pitchFamily="18" charset="0"/>
+            </a:endParaRPr>
+          </a:p>
+          <a:p>
+            <a:endParaRPr lang="en-US" dirty="0"/>
+          </a:p>
+        </p:txBody>
+      </p:sp>
+      <p:sp>
+        <p:nvSpPr>
+          <p:cNvPr id="4" name="Slide Number Placeholder 3"/>
+          <p:cNvSpPr>
+            <a:spLocks noGrp="1"/>
+          </p:cNvSpPr>
+          <p:nvPr>
+            <p:ph type="sldNum" sz="quarter" idx="5"/>
+          </p:nvPr>
+        </p:nvSpPr>
+        <p:spPr/>
+        <p:txBody>
+          <a:bodyPr/>
+          <a:lstStyle/>
+          <a:p>
+            <a:fld id="{95646C1A-F1D7-49BA-A1FF-7E74335FB05C}" type="slidenum">
+              <a:rPr lang="en-US" smtClean="0"/>
+              <a:t>3</a:t>
+            </a:fld>
+            <a:endParaRPr lang="en-US"/>
+          </a:p>
+        </p:txBody>
+      </p:sp>
+    </p:spTree>
+    <p:extLst>
+      <p:ext uri="{BB962C8B-B14F-4D97-AF65-F5344CB8AC3E}">
+        <p14:creationId xmlns:p14="http://schemas.microsoft.com/office/powerpoint/2010/main" val="996802745"/>
+      </p:ext>
+    </p:extLst>
+  </p:cSld>
+  <p:clrMapOvr>
+    <a:masterClrMapping/>
+  </p:clrMapOvr>
+</p:notes>
 </file>
 
 <file path=ppt/slideLayouts/slideLayout1.xml><?xml version="1.0" encoding="utf-8"?>
@@ -6405,15 +7624,15 @@
           </p:nvPr>
         </p:nvPicPr>
         <p:blipFill>
-          <a:blip r:embed="rId2"/>
+          <a:blip r:embed="rId3"/>
           <a:stretch>
             <a:fillRect/>
           </a:stretch>
         </p:blipFill>
         <p:spPr>
           <a:xfrm>
-            <a:off x="710770" y="1671383"/>
-            <a:ext cx="8256969" cy="4128484"/>
+            <a:off x="75369" y="2239222"/>
+            <a:ext cx="6020631" cy="3010315"/>
           </a:xfrm>
         </p:spPr>
       </p:pic>
@@ -6431,8 +7650,8 @@
         </p:nvSpPr>
         <p:spPr>
           <a:xfrm>
-            <a:off x="9428723" y="3094883"/>
-            <a:ext cx="2628215" cy="707886"/>
+            <a:off x="717057" y="5751883"/>
+            <a:ext cx="4737253" cy="523220"/>
           </a:xfrm>
           <a:prstGeom prst="rect">
             <a:avLst/>
@@ -6446,8 +7665,73 @@
           <a:lstStyle/>
           <a:p>
             <a:r>
-              <a:rPr lang="en-US" sz="2000" b="1" dirty="0"/>
-              <a:t>Units sold declined                                  20%</a:t>
+              <a:rPr lang="en-US" sz="2800" b="1" dirty="0"/>
+              <a:t>Units sold declined 20%                              </a:t>
+            </a:r>
+          </a:p>
+        </p:txBody>
+      </p:sp>
+      <p:pic>
+        <p:nvPicPr>
+          <p:cNvPr id="4" name="Content Placeholder 5" descr="A graph of sales&#10;&#10;Description automatically generated">
+            <a:extLst>
+              <a:ext uri="{FF2B5EF4-FFF2-40B4-BE49-F238E27FC236}">
+                <a16:creationId xmlns:a16="http://schemas.microsoft.com/office/drawing/2014/main" id="{846E6031-B1C5-7DC4-3F3A-183FA8DA00B8}"/>
+              </a:ext>
+            </a:extLst>
+          </p:cNvPr>
+          <p:cNvPicPr>
+            <a:picLocks noChangeAspect="1"/>
+          </p:cNvPicPr>
+          <p:nvPr/>
+        </p:nvPicPr>
+        <p:blipFill>
+          <a:blip r:embed="rId4"/>
+          <a:stretch>
+            <a:fillRect/>
+          </a:stretch>
+        </p:blipFill>
+        <p:spPr>
+          <a:xfrm>
+            <a:off x="6096000" y="2239221"/>
+            <a:ext cx="6020630" cy="3010315"/>
+          </a:xfrm>
+          <a:prstGeom prst="rect">
+            <a:avLst/>
+          </a:prstGeom>
+        </p:spPr>
+      </p:pic>
+      <p:sp>
+        <p:nvSpPr>
+          <p:cNvPr id="7" name="TextBox 6">
+            <a:extLst>
+              <a:ext uri="{FF2B5EF4-FFF2-40B4-BE49-F238E27FC236}">
+                <a16:creationId xmlns:a16="http://schemas.microsoft.com/office/drawing/2014/main" id="{C8BAEDF2-FAEE-F902-2393-8E51D40471E1}"/>
+              </a:ext>
+            </a:extLst>
+          </p:cNvPr>
+          <p:cNvSpPr txBox="1"/>
+          <p:nvPr/>
+        </p:nvSpPr>
+        <p:spPr>
+          <a:xfrm>
+            <a:off x="7001916" y="5751883"/>
+            <a:ext cx="6097836" cy="523220"/>
+          </a:xfrm>
+          <a:prstGeom prst="rect">
+            <a:avLst/>
+          </a:prstGeom>
+          <a:noFill/>
+        </p:spPr>
+        <p:txBody>
+          <a:bodyPr wrap="square">
+            <a:spAutoFit/>
+          </a:bodyPr>
+          <a:lstStyle/>
+          <a:p>
+            <a:r>
+              <a:rPr lang="en-US" sz="2800" b="1" dirty="0"/>
+              <a:t>Total Revenue rose 27%</a:t>
             </a:r>
           </a:p>
         </p:txBody>
@@ -6487,130 +7771,6 @@
           <p:cNvPr id="2" name="Title 1">
             <a:extLst>
               <a:ext uri="{FF2B5EF4-FFF2-40B4-BE49-F238E27FC236}">
-                <a16:creationId xmlns:a16="http://schemas.microsoft.com/office/drawing/2014/main" id="{32580036-B13A-34B2-6322-206E877C166F}"/>
-              </a:ext>
-            </a:extLst>
-          </p:cNvPr>
-          <p:cNvSpPr>
-            <a:spLocks noGrp="1"/>
-          </p:cNvSpPr>
-          <p:nvPr>
-            <p:ph type="title"/>
-          </p:nvPr>
-        </p:nvSpPr>
-        <p:spPr/>
-        <p:txBody>
-          <a:bodyPr/>
-          <a:lstStyle/>
-          <a:p>
-            <a:r>
-              <a:rPr lang="en-US" sz="4800" dirty="0">
-                <a:latin typeface="Amasis MT Pro Medium" panose="02040604050005020304" pitchFamily="18" charset="0"/>
-              </a:rPr>
-              <a:t>How did Sales Revenue Change?</a:t>
-            </a:r>
-          </a:p>
-        </p:txBody>
-      </p:sp>
-      <p:pic>
-        <p:nvPicPr>
-          <p:cNvPr id="6" name="Content Placeholder 5" descr="A graph of sales&#10;&#10;Description automatically generated">
-            <a:extLst>
-              <a:ext uri="{FF2B5EF4-FFF2-40B4-BE49-F238E27FC236}">
-                <a16:creationId xmlns:a16="http://schemas.microsoft.com/office/drawing/2014/main" id="{6283C8A4-DA6D-6708-5E7A-5FCC6DC65883}"/>
-              </a:ext>
-            </a:extLst>
-          </p:cNvPr>
-          <p:cNvPicPr>
-            <a:picLocks noGrp="1" noChangeAspect="1"/>
-          </p:cNvPicPr>
-          <p:nvPr>
-            <p:ph sz="half" idx="1"/>
-          </p:nvPr>
-        </p:nvPicPr>
-        <p:blipFill>
-          <a:blip r:embed="rId2"/>
-          <a:stretch>
-            <a:fillRect/>
-          </a:stretch>
-        </p:blipFill>
-        <p:spPr>
-          <a:xfrm>
-            <a:off x="646111" y="1745592"/>
-            <a:ext cx="8569070" cy="4284535"/>
-          </a:xfrm>
-        </p:spPr>
-      </p:pic>
-      <p:sp>
-        <p:nvSpPr>
-          <p:cNvPr id="3" name="TextBox 2">
-            <a:extLst>
-              <a:ext uri="{FF2B5EF4-FFF2-40B4-BE49-F238E27FC236}">
-                <a16:creationId xmlns:a16="http://schemas.microsoft.com/office/drawing/2014/main" id="{24E5232F-3930-6756-FAB5-D383DC7EB23A}"/>
-              </a:ext>
-            </a:extLst>
-          </p:cNvPr>
-          <p:cNvSpPr txBox="1"/>
-          <p:nvPr/>
-        </p:nvSpPr>
-        <p:spPr>
-          <a:xfrm>
-            <a:off x="9525457" y="3098362"/>
-            <a:ext cx="2666543" cy="661275"/>
-          </a:xfrm>
-          <a:prstGeom prst="rect">
-            <a:avLst/>
-          </a:prstGeom>
-          <a:noFill/>
-        </p:spPr>
-        <p:txBody>
-          <a:bodyPr wrap="square" rtlCol="0">
-            <a:spAutoFit/>
-          </a:bodyPr>
-          <a:lstStyle/>
-          <a:p>
-            <a:r>
-              <a:rPr lang="en-US" b="1" dirty="0"/>
-              <a:t>Total Revenue rose 27%</a:t>
-            </a:r>
-          </a:p>
-        </p:txBody>
-      </p:sp>
-    </p:spTree>
-    <p:extLst>
-      <p:ext uri="{BB962C8B-B14F-4D97-AF65-F5344CB8AC3E}">
-        <p14:creationId xmlns:p14="http://schemas.microsoft.com/office/powerpoint/2010/main" val="935300625"/>
-      </p:ext>
-    </p:extLst>
-  </p:cSld>
-  <p:clrMapOvr>
-    <a:masterClrMapping/>
-  </p:clrMapOvr>
-</p:sld>
-</file>
-
-<file path=ppt/slides/slide4.xml><?xml version="1.0" encoding="utf-8"?>
-<p:sld xmlns:a="http://schemas.openxmlformats.org/drawingml/2006/main" xmlns:r="http://schemas.openxmlformats.org/officeDocument/2006/relationships" xmlns:p="http://schemas.openxmlformats.org/presentationml/2006/main">
-  <p:cSld>
-    <p:spTree>
-      <p:nvGrpSpPr>
-        <p:cNvPr id="1" name=""/>
-        <p:cNvGrpSpPr/>
-        <p:nvPr/>
-      </p:nvGrpSpPr>
-      <p:grpSpPr>
-        <a:xfrm>
-          <a:off x="0" y="0"/>
-          <a:ext cx="0" cy="0"/>
-          <a:chOff x="0" y="0"/>
-          <a:chExt cx="0" cy="0"/>
-        </a:xfrm>
-      </p:grpSpPr>
-      <p:sp>
-        <p:nvSpPr>
-          <p:cNvPr id="2" name="Title 1">
-            <a:extLst>
-              <a:ext uri="{FF2B5EF4-FFF2-40B4-BE49-F238E27FC236}">
                 <a16:creationId xmlns:a16="http://schemas.microsoft.com/office/drawing/2014/main" id="{7506558A-862F-9EC0-1789-1F7AE94DD68C}"/>
               </a:ext>
             </a:extLst>
@@ -6653,7 +7813,7 @@
           </p:nvPr>
         </p:nvPicPr>
         <p:blipFill>
-          <a:blip r:embed="rId2"/>
+          <a:blip r:embed="rId3"/>
           <a:stretch>
             <a:fillRect/>
           </a:stretch>
@@ -6713,7 +7873,7 @@
 </p:sld>
 </file>
 
-<file path=ppt/slides/slide5.xml><?xml version="1.0" encoding="utf-8"?>
+<file path=ppt/slides/slide4.xml><?xml version="1.0" encoding="utf-8"?>
 <p:sld xmlns:a="http://schemas.openxmlformats.org/drawingml/2006/main" xmlns:r="http://schemas.openxmlformats.org/officeDocument/2006/relationships" xmlns:p="http://schemas.openxmlformats.org/presentationml/2006/main">
   <p:cSld>
     <p:spTree>
@@ -6909,7 +8069,7 @@
 </p:sld>
 </file>
 
-<file path=ppt/slides/slide6.xml><?xml version="1.0" encoding="utf-8"?>
+<file path=ppt/slides/slide5.xml><?xml version="1.0" encoding="utf-8"?>
 <p:sld xmlns:a="http://schemas.openxmlformats.org/drawingml/2006/main" xmlns:r="http://schemas.openxmlformats.org/officeDocument/2006/relationships" xmlns:p="http://schemas.openxmlformats.org/presentationml/2006/main">
   <p:cSld>
     <p:spTree>
@@ -7065,7 +8225,7 @@
 </p:sld>
 </file>
 
-<file path=ppt/slides/slide7.xml><?xml version="1.0" encoding="utf-8"?>
+<file path=ppt/slides/slide6.xml><?xml version="1.0" encoding="utf-8"?>
 <p:sld xmlns:a="http://schemas.openxmlformats.org/drawingml/2006/main" xmlns:r="http://schemas.openxmlformats.org/officeDocument/2006/relationships" xmlns:p="http://schemas.openxmlformats.org/presentationml/2006/main">
   <p:cSld>
     <p:spTree>
@@ -7173,7 +8333,7 @@
 </p:sld>
 </file>
 
-<file path=ppt/slides/slide8.xml><?xml version="1.0" encoding="utf-8"?>
+<file path=ppt/slides/slide7.xml><?xml version="1.0" encoding="utf-8"?>
 <p:sld xmlns:a="http://schemas.openxmlformats.org/drawingml/2006/main" xmlns:r="http://schemas.openxmlformats.org/officeDocument/2006/relationships" xmlns:p="http://schemas.openxmlformats.org/presentationml/2006/main">
   <p:cSld>
     <p:spTree>
@@ -7542,4 +8702,299 @@
     </a:ext>
   </a:extLst>
 </a:theme>
+</file>
+
+<file path=ppt/theme/theme2.xml><?xml version="1.0" encoding="utf-8"?>
+<a:theme xmlns:a="http://schemas.openxmlformats.org/drawingml/2006/main" name="Office Theme">
+  <a:themeElements>
+    <a:clrScheme name="Office">
+      <a:dk1>
+        <a:sysClr val="windowText" lastClr="000000"/>
+      </a:dk1>
+      <a:lt1>
+        <a:sysClr val="window" lastClr="FFFFFF"/>
+      </a:lt1>
+      <a:dk2>
+        <a:srgbClr val="44546A"/>
+      </a:dk2>
+      <a:lt2>
+        <a:srgbClr val="E7E6E6"/>
+      </a:lt2>
+      <a:accent1>
+        <a:srgbClr val="4472C4"/>
+      </a:accent1>
+      <a:accent2>
+        <a:srgbClr val="ED7D31"/>
+      </a:accent2>
+      <a:accent3>
+        <a:srgbClr val="A5A5A5"/>
+      </a:accent3>
+      <a:accent4>
+        <a:srgbClr val="FFC000"/>
+      </a:accent4>
+      <a:accent5>
+        <a:srgbClr val="5B9BD5"/>
+      </a:accent5>
+      <a:accent6>
+        <a:srgbClr val="70AD47"/>
+      </a:accent6>
+      <a:hlink>
+        <a:srgbClr val="0563C1"/>
+      </a:hlink>
+      <a:folHlink>
+        <a:srgbClr val="954F72"/>
+      </a:folHlink>
+    </a:clrScheme>
+    <a:fontScheme name="Office">
+      <a:majorFont>
+        <a:latin typeface="Calibri Light" panose="020F0302020204030204"/>
+        <a:ea typeface=""/>
+        <a:cs typeface=""/>
+        <a:font script="Jpan" typeface="游ゴシック Light"/>
+        <a:font script="Hang" typeface="맑은 고딕"/>
+        <a:font script="Hans" typeface="等线 Light"/>
+        <a:font script="Hant" typeface="新細明體"/>
+        <a:font script="Arab" typeface="Times New Roman"/>
+        <a:font script="Hebr" typeface="Times New Roman"/>
+        <a:font script="Thai" typeface="Angsana New"/>
+        <a:font script="Ethi" typeface="Nyala"/>
+        <a:font script="Beng" typeface="Vrinda"/>
+        <a:font script="Gujr" typeface="Shruti"/>
+        <a:font script="Khmr" typeface="MoolBoran"/>
+        <a:font script="Knda" typeface="Tunga"/>
+        <a:font script="Guru" typeface="Raavi"/>
+        <a:font script="Cans" typeface="Euphemia"/>
+        <a:font script="Cher" typeface="Plantagenet Cherokee"/>
+        <a:font script="Yiii" typeface="Microsoft Yi Baiti"/>
+        <a:font script="Tibt" typeface="Microsoft Himalaya"/>
+        <a:font script="Thaa" typeface="MV Boli"/>
+        <a:font script="Deva" typeface="Mangal"/>
+        <a:font script="Telu" typeface="Gautami"/>
+        <a:font script="Taml" typeface="Latha"/>
+        <a:font script="Syrc" typeface="Estrangelo Edessa"/>
+        <a:font script="Orya" typeface="Kalinga"/>
+        <a:font script="Mlym" typeface="Kartika"/>
+        <a:font script="Laoo" typeface="DokChampa"/>
+        <a:font script="Sinh" typeface="Iskoola Pota"/>
+        <a:font script="Mong" typeface="Mongolian Baiti"/>
+        <a:font script="Viet" typeface="Times New Roman"/>
+        <a:font script="Uigh" typeface="Microsoft Uighur"/>
+        <a:font script="Geor" typeface="Sylfaen"/>
+        <a:font script="Armn" typeface="Arial"/>
+        <a:font script="Bugi" typeface="Leelawadee UI"/>
+        <a:font script="Bopo" typeface="Microsoft JhengHei"/>
+        <a:font script="Java" typeface="Javanese Text"/>
+        <a:font script="Lisu" typeface="Segoe UI"/>
+        <a:font script="Mymr" typeface="Myanmar Text"/>
+        <a:font script="Nkoo" typeface="Ebrima"/>
+        <a:font script="Olck" typeface="Nirmala UI"/>
+        <a:font script="Osma" typeface="Ebrima"/>
+        <a:font script="Phag" typeface="Phagspa"/>
+        <a:font script="Syrn" typeface="Estrangelo Edessa"/>
+        <a:font script="Syrj" typeface="Estrangelo Edessa"/>
+        <a:font script="Syre" typeface="Estrangelo Edessa"/>
+        <a:font script="Sora" typeface="Nirmala UI"/>
+        <a:font script="Tale" typeface="Microsoft Tai Le"/>
+        <a:font script="Talu" typeface="Microsoft New Tai Lue"/>
+        <a:font script="Tfng" typeface="Ebrima"/>
+      </a:majorFont>
+      <a:minorFont>
+        <a:latin typeface="Calibri" panose="020F0502020204030204"/>
+        <a:ea typeface=""/>
+        <a:cs typeface=""/>
+        <a:font script="Jpan" typeface="游ゴシック"/>
+        <a:font script="Hang" typeface="맑은 고딕"/>
+        <a:font script="Hans" typeface="等线"/>
+        <a:font script="Hant" typeface="新細明體"/>
+        <a:font script="Arab" typeface="Arial"/>
+        <a:font script="Hebr" typeface="Arial"/>
+        <a:font script="Thai" typeface="Cordia New"/>
+        <a:font script="Ethi" typeface="Nyala"/>
+        <a:font script="Beng" typeface="Vrinda"/>
+        <a:font script="Gujr" typeface="Shruti"/>
+        <a:font script="Khmr" typeface="DaunPenh"/>
+        <a:font script="Knda" typeface="Tunga"/>
+        <a:font script="Guru" typeface="Raavi"/>
+        <a:font script="Cans" typeface="Euphemia"/>
+        <a:font script="Cher" typeface="Plantagenet Cherokee"/>
+        <a:font script="Yiii" typeface="Microsoft Yi Baiti"/>
+        <a:font script="Tibt" typeface="Microsoft Himalaya"/>
+        <a:font script="Thaa" typeface="MV Boli"/>
+        <a:font script="Deva" typeface="Mangal"/>
+        <a:font script="Telu" typeface="Gautami"/>
+        <a:font script="Taml" typeface="Latha"/>
+        <a:font script="Syrc" typeface="Estrangelo Edessa"/>
+        <a:font script="Orya" typeface="Kalinga"/>
+        <a:font script="Mlym" typeface="Kartika"/>
+        <a:font script="Laoo" typeface="DokChampa"/>
+        <a:font script="Sinh" typeface="Iskoola Pota"/>
+        <a:font script="Mong" typeface="Mongolian Baiti"/>
+        <a:font script="Viet" typeface="Arial"/>
+        <a:font script="Uigh" typeface="Microsoft Uighur"/>
+        <a:font script="Geor" typeface="Sylfaen"/>
+        <a:font script="Armn" typeface="Arial"/>
+        <a:font script="Bugi" typeface="Leelawadee UI"/>
+        <a:font script="Bopo" typeface="Microsoft JhengHei"/>
+        <a:font script="Java" typeface="Javanese Text"/>
+        <a:font script="Lisu" typeface="Segoe UI"/>
+        <a:font script="Mymr" typeface="Myanmar Text"/>
+        <a:font script="Nkoo" typeface="Ebrima"/>
+        <a:font script="Olck" typeface="Nirmala UI"/>
+        <a:font script="Osma" typeface="Ebrima"/>
+        <a:font script="Phag" typeface="Phagspa"/>
+        <a:font script="Syrn" typeface="Estrangelo Edessa"/>
+        <a:font script="Syrj" typeface="Estrangelo Edessa"/>
+        <a:font script="Syre" typeface="Estrangelo Edessa"/>
+        <a:font script="Sora" typeface="Nirmala UI"/>
+        <a:font script="Tale" typeface="Microsoft Tai Le"/>
+        <a:font script="Talu" typeface="Microsoft New Tai Lue"/>
+        <a:font script="Tfng" typeface="Ebrima"/>
+      </a:minorFont>
+    </a:fontScheme>
+    <a:fmtScheme name="Office">
+      <a:fillStyleLst>
+        <a:solidFill>
+          <a:schemeClr val="phClr"/>
+        </a:solidFill>
+        <a:gradFill rotWithShape="1">
+          <a:gsLst>
+            <a:gs pos="0">
+              <a:schemeClr val="phClr">
+                <a:lumMod val="110000"/>
+                <a:satMod val="105000"/>
+                <a:tint val="67000"/>
+              </a:schemeClr>
+            </a:gs>
+            <a:gs pos="50000">
+              <a:schemeClr val="phClr">
+                <a:lumMod val="105000"/>
+                <a:satMod val="103000"/>
+                <a:tint val="73000"/>
+              </a:schemeClr>
+            </a:gs>
+            <a:gs pos="100000">
+              <a:schemeClr val="phClr">
+                <a:lumMod val="105000"/>
+                <a:satMod val="109000"/>
+                <a:tint val="81000"/>
+              </a:schemeClr>
+            </a:gs>
+          </a:gsLst>
+          <a:lin ang="5400000" scaled="0"/>
+        </a:gradFill>
+        <a:gradFill rotWithShape="1">
+          <a:gsLst>
+            <a:gs pos="0">
+              <a:schemeClr val="phClr">
+                <a:satMod val="103000"/>
+                <a:lumMod val="102000"/>
+                <a:tint val="94000"/>
+              </a:schemeClr>
+            </a:gs>
+            <a:gs pos="50000">
+              <a:schemeClr val="phClr">
+                <a:satMod val="110000"/>
+                <a:lumMod val="100000"/>
+                <a:shade val="100000"/>
+              </a:schemeClr>
+            </a:gs>
+            <a:gs pos="100000">
+              <a:schemeClr val="phClr">
+                <a:lumMod val="99000"/>
+                <a:satMod val="120000"/>
+                <a:shade val="78000"/>
+              </a:schemeClr>
+            </a:gs>
+          </a:gsLst>
+          <a:lin ang="5400000" scaled="0"/>
+        </a:gradFill>
+      </a:fillStyleLst>
+      <a:lnStyleLst>
+        <a:ln w="6350" cap="flat" cmpd="sng" algn="ctr">
+          <a:solidFill>
+            <a:schemeClr val="phClr"/>
+          </a:solidFill>
+          <a:prstDash val="solid"/>
+          <a:miter lim="800000"/>
+        </a:ln>
+        <a:ln w="12700" cap="flat" cmpd="sng" algn="ctr">
+          <a:solidFill>
+            <a:schemeClr val="phClr"/>
+          </a:solidFill>
+          <a:prstDash val="solid"/>
+          <a:miter lim="800000"/>
+        </a:ln>
+        <a:ln w="19050" cap="flat" cmpd="sng" algn="ctr">
+          <a:solidFill>
+            <a:schemeClr val="phClr"/>
+          </a:solidFill>
+          <a:prstDash val="solid"/>
+          <a:miter lim="800000"/>
+        </a:ln>
+      </a:lnStyleLst>
+      <a:effectStyleLst>
+        <a:effectStyle>
+          <a:effectLst/>
+        </a:effectStyle>
+        <a:effectStyle>
+          <a:effectLst/>
+        </a:effectStyle>
+        <a:effectStyle>
+          <a:effectLst>
+            <a:outerShdw blurRad="57150" dist="19050" dir="5400000" algn="ctr" rotWithShape="0">
+              <a:srgbClr val="000000">
+                <a:alpha val="63000"/>
+              </a:srgbClr>
+            </a:outerShdw>
+          </a:effectLst>
+        </a:effectStyle>
+      </a:effectStyleLst>
+      <a:bgFillStyleLst>
+        <a:solidFill>
+          <a:schemeClr val="phClr"/>
+        </a:solidFill>
+        <a:solidFill>
+          <a:schemeClr val="phClr">
+            <a:tint val="95000"/>
+            <a:satMod val="170000"/>
+          </a:schemeClr>
+        </a:solidFill>
+        <a:gradFill rotWithShape="1">
+          <a:gsLst>
+            <a:gs pos="0">
+              <a:schemeClr val="phClr">
+                <a:tint val="93000"/>
+                <a:satMod val="150000"/>
+                <a:shade val="98000"/>
+                <a:lumMod val="102000"/>
+              </a:schemeClr>
+            </a:gs>
+            <a:gs pos="50000">
+              <a:schemeClr val="phClr">
+                <a:tint val="98000"/>
+                <a:satMod val="130000"/>
+                <a:shade val="90000"/>
+                <a:lumMod val="103000"/>
+              </a:schemeClr>
+            </a:gs>
+            <a:gs pos="100000">
+              <a:schemeClr val="phClr">
+                <a:shade val="63000"/>
+                <a:satMod val="120000"/>
+              </a:schemeClr>
+            </a:gs>
+          </a:gsLst>
+          <a:lin ang="5400000" scaled="0"/>
+        </a:gradFill>
+      </a:bgFillStyleLst>
+    </a:fmtScheme>
+  </a:themeElements>
+  <a:objectDefaults/>
+  <a:extraClrSchemeLst/>
+  <a:extLst>
+    <a:ext uri="{05A4C25C-085E-4340-85A3-A5531E510DB2}">
+      <thm15:themeFamily xmlns:thm15="http://schemas.microsoft.com/office/thememl/2012/main" name="Office Theme" id="{62F939B6-93AF-4DB8-9C6B-D6C7DFDC589F}" vid="{4A3C46E8-61CC-4603-A589-7422A47A8E4A}"/>
+    </a:ext>
+  </a:extLst>
+</a:theme>
 </file>
</xml_diff>

<commit_message>
Last couple slide changes
</commit_message>
<xml_diff>
--- a/Project 1 Presentation .pptx
+++ b/Project 1 Presentation .pptx
@@ -221,7 +221,7 @@
   <pc:docChgLst>
     <pc:chgData name="TJ Davis" userId="2472d7e42abb0c91" providerId="LiveId" clId="{A21625FD-0973-4D47-987E-B56EF70EDD32}"/>
     <pc:docChg chg="custSel delSld modSld">
-      <pc:chgData name="TJ Davis" userId="2472d7e42abb0c91" providerId="LiveId" clId="{A21625FD-0973-4D47-987E-B56EF70EDD32}" dt="2023-08-16T00:59:37.332" v="806"/>
+      <pc:chgData name="TJ Davis" userId="2472d7e42abb0c91" providerId="LiveId" clId="{A21625FD-0973-4D47-987E-B56EF70EDD32}" dt="2023-08-16T01:13:26.720" v="1121" actId="20577"/>
       <pc:docMkLst>
         <pc:docMk/>
       </pc:docMkLst>
@@ -233,7 +233,7 @@
         </pc:sldMkLst>
       </pc:sldChg>
       <pc:sldChg chg="addSp modSp mod modNotesTx">
-        <pc:chgData name="TJ Davis" userId="2472d7e42abb0c91" providerId="LiveId" clId="{A21625FD-0973-4D47-987E-B56EF70EDD32}" dt="2023-08-16T00:59:24.121" v="805" actId="20577"/>
+        <pc:chgData name="TJ Davis" userId="2472d7e42abb0c91" providerId="LiveId" clId="{A21625FD-0973-4D47-987E-B56EF70EDD32}" dt="2023-08-16T01:12:30.731" v="1068" actId="20577"/>
         <pc:sldMkLst>
           <pc:docMk/>
           <pc:sldMk cId="3257304099" sldId="257"/>
@@ -279,7 +279,7 @@
         </pc:sldMkLst>
       </pc:sldChg>
       <pc:sldChg chg="modNotesTx">
-        <pc:chgData name="TJ Davis" userId="2472d7e42abb0c91" providerId="LiveId" clId="{A21625FD-0973-4D47-987E-B56EF70EDD32}" dt="2023-08-16T00:59:37.332" v="806"/>
+        <pc:chgData name="TJ Davis" userId="2472d7e42abb0c91" providerId="LiveId" clId="{A21625FD-0973-4D47-987E-B56EF70EDD32}" dt="2023-08-16T01:13:26.720" v="1121" actId="20577"/>
         <pc:sldMkLst>
           <pc:docMk/>
           <pc:sldMk cId="1975536614" sldId="263"/>
@@ -868,7 +868,7 @@
             </a:pPr>
             <a:r>
               <a:rPr lang="en-US" dirty="0"/>
-              <a:t>You’ll see the horizontal lines mark some events that occurred during the pandemic that may have had an effect on sales volume.</a:t>
+              <a:t>How were vehicle sales effected between Jan 2020 and Dec 2023?</a:t>
             </a:r>
           </a:p>
           <a:p>
@@ -878,7 +878,17 @@
             </a:pPr>
             <a:r>
               <a:rPr lang="en-US" dirty="0"/>
-              <a:t>Overall, we saw a 20% decline in total units sold during this 3 year period.</a:t>
+              <a:t>You’ll see the horizontal lines mark some events that occurred during the pandemic that may have had an effect on sales volume.</a:t>
+            </a:r>
+          </a:p>
+          <a:p>
+            <a:pPr marL="171450" indent="-171450">
+              <a:buFont typeface="Arial" panose="020B0604020202020204" pitchFamily="34" charset="0"/>
+              <a:buChar char="•"/>
+            </a:pPr>
+            <a:r>
+              <a:rPr lang="en-US" dirty="0"/>
+              <a:t>Overall, you can see we saw a 20% decline in total units sold during this 3 year period.</a:t>
             </a:r>
           </a:p>
           <a:p>
@@ -944,7 +954,83 @@
                 <a:ea typeface="Calibri" panose="020F0502020204030204" pitchFamily="34" charset="0"/>
                 <a:cs typeface="Times New Roman" panose="02020603050405020304" pitchFamily="18" charset="0"/>
               </a:rPr>
-              <a:t>Why is that? Dustin has some thoughts on that in the later slides.</a:t>
+              <a:t>You also notice that </a:t>
+            </a:r>
+            <a:r>
+              <a:rPr lang="en-US" sz="1800" kern="0" dirty="0">
+                <a:effectLst/>
+                <a:latin typeface="Segoe UI" panose="020B0502040204020203" pitchFamily="34" charset="0"/>
+                <a:ea typeface="Times New Roman" panose="02020603050405020304" pitchFamily="18" charset="0"/>
+              </a:rPr>
+              <a:t>starting in April of 2021, over a year since the pandemic began, the total number of units sold decreases, while the total revenue on those sales actually increased substantially. </a:t>
+            </a:r>
+          </a:p>
+          <a:p>
+            <a:pPr marL="342900" marR="0" lvl="0" indent="-342900">
+              <a:lnSpc>
+                <a:spcPct val="107000"/>
+              </a:lnSpc>
+              <a:spcBef>
+                <a:spcPts val="0"/>
+              </a:spcBef>
+              <a:spcAft>
+                <a:spcPts val="800"/>
+              </a:spcAft>
+              <a:buSzPts val="1000"/>
+              <a:buFont typeface="Symbol" panose="05050102010706020507" pitchFamily="18" charset="2"/>
+              <a:buChar char=""/>
+              <a:tabLst>
+                <a:tab pos="457200" algn="l"/>
+              </a:tabLst>
+            </a:pPr>
+            <a:r>
+              <a:rPr lang="en-US" sz="1800" kern="0" dirty="0">
+                <a:solidFill>
+                  <a:srgbClr val="000000"/>
+                </a:solidFill>
+                <a:effectLst/>
+                <a:latin typeface="Segoe UI" panose="020B0502040204020203" pitchFamily="34" charset="0"/>
+                <a:ea typeface="Times New Roman" panose="02020603050405020304" pitchFamily="18" charset="0"/>
+                <a:cs typeface="Times New Roman" panose="02020603050405020304" pitchFamily="18" charset="0"/>
+              </a:rPr>
+              <a:t>In Nov of 2020 there were almost 17M units sold that generated about 9 billion dollars in revenue.</a:t>
+            </a:r>
+            <a:endParaRPr lang="en-US" sz="1800" kern="100" dirty="0">
+              <a:effectLst/>
+              <a:latin typeface="Calibri" panose="020F0502020204030204" pitchFamily="34" charset="0"/>
+              <a:ea typeface="Calibri" panose="020F0502020204030204" pitchFamily="34" charset="0"/>
+              <a:cs typeface="Times New Roman" panose="02020603050405020304" pitchFamily="18" charset="0"/>
+            </a:endParaRPr>
+          </a:p>
+          <a:p>
+            <a:pPr marL="342900" marR="0" lvl="0" indent="-342900">
+              <a:lnSpc>
+                <a:spcPct val="107000"/>
+              </a:lnSpc>
+              <a:spcBef>
+                <a:spcPts val="0"/>
+              </a:spcBef>
+              <a:spcAft>
+                <a:spcPts val="800"/>
+              </a:spcAft>
+              <a:buSzPts val="1000"/>
+              <a:buFont typeface="Symbol" panose="05050102010706020507" pitchFamily="18" charset="2"/>
+              <a:buChar char=""/>
+              <a:tabLst>
+                <a:tab pos="457200" algn="l"/>
+              </a:tabLst>
+            </a:pPr>
+            <a:r>
+              <a:rPr lang="en-US" sz="1800" kern="0" dirty="0">
+                <a:solidFill>
+                  <a:srgbClr val="000000"/>
+                </a:solidFill>
+                <a:effectLst/>
+                <a:latin typeface="Segoe UI" panose="020B0502040204020203" pitchFamily="34" charset="0"/>
+                <a:ea typeface="Times New Roman" panose="02020603050405020304" pitchFamily="18" charset="0"/>
+                <a:cs typeface="Times New Roman" panose="02020603050405020304" pitchFamily="18" charset="0"/>
+              </a:rPr>
+              <a:t>From Nov 2020 to April 2021, Units sold remained relatively stable and flat while revenue soared from 9 Billion to near 17 billion dollars on the same volume of cars sold. </a:t>
             </a:r>
           </a:p>
           <a:p>
@@ -975,109 +1061,8 @@
                 <a:ea typeface="Calibri" panose="020F0502020204030204" pitchFamily="34" charset="0"/>
                 <a:cs typeface="Times New Roman" panose="02020603050405020304" pitchFamily="18" charset="0"/>
               </a:rPr>
-              <a:t>You also notice that </a:t>
-            </a:r>
-            <a:r>
-              <a:rPr lang="en-US" sz="1800" kern="0" dirty="0">
-                <a:effectLst/>
-                <a:latin typeface="Segoe UI" panose="020B0502040204020203" pitchFamily="34" charset="0"/>
-                <a:ea typeface="Times New Roman" panose="02020603050405020304" pitchFamily="18" charset="0"/>
-              </a:rPr>
-              <a:t>starting in April of 2021, over a year since the pandemic began, the total number of units sold decreases, while the total revenue on those sales increased substantially. </a:t>
-            </a:r>
-          </a:p>
-          <a:p>
-            <a:pPr marL="342900" marR="0" lvl="0" indent="-342900">
-              <a:lnSpc>
-                <a:spcPct val="107000"/>
-              </a:lnSpc>
-              <a:spcBef>
-                <a:spcPts val="0"/>
-              </a:spcBef>
-              <a:spcAft>
-                <a:spcPts val="800"/>
-              </a:spcAft>
-              <a:buSzPts val="1000"/>
-              <a:buFont typeface="Symbol" panose="05050102010706020507" pitchFamily="18" charset="2"/>
-              <a:buChar char=""/>
-              <a:tabLst>
-                <a:tab pos="457200" algn="l"/>
-              </a:tabLst>
-            </a:pPr>
-            <a:r>
-              <a:rPr lang="en-US" sz="1800" kern="0" dirty="0">
-                <a:solidFill>
-                  <a:srgbClr val="000000"/>
-                </a:solidFill>
-                <a:effectLst/>
-                <a:latin typeface="Segoe UI" panose="020B0502040204020203" pitchFamily="34" charset="0"/>
-                <a:ea typeface="Times New Roman" panose="02020603050405020304" pitchFamily="18" charset="0"/>
-                <a:cs typeface="Times New Roman" panose="02020603050405020304" pitchFamily="18" charset="0"/>
-              </a:rPr>
-              <a:t>In Nov of 2020 there were almost 17M units sold that generated about 9 billion dollars in revenue.</a:t>
-            </a:r>
-            <a:endParaRPr lang="en-US" sz="1800" kern="100" dirty="0">
-              <a:effectLst/>
-              <a:latin typeface="Calibri" panose="020F0502020204030204" pitchFamily="34" charset="0"/>
-              <a:ea typeface="Calibri" panose="020F0502020204030204" pitchFamily="34" charset="0"/>
-              <a:cs typeface="Times New Roman" panose="02020603050405020304" pitchFamily="18" charset="0"/>
-            </a:endParaRPr>
-          </a:p>
-          <a:p>
-            <a:pPr marL="342900" marR="0" lvl="0" indent="-342900">
-              <a:lnSpc>
-                <a:spcPct val="107000"/>
-              </a:lnSpc>
-              <a:spcBef>
-                <a:spcPts val="0"/>
-              </a:spcBef>
-              <a:spcAft>
-                <a:spcPts val="800"/>
-              </a:spcAft>
-              <a:buSzPts val="1000"/>
-              <a:buFont typeface="Symbol" panose="05050102010706020507" pitchFamily="18" charset="2"/>
-              <a:buChar char=""/>
-              <a:tabLst>
-                <a:tab pos="457200" algn="l"/>
-              </a:tabLst>
-            </a:pPr>
-            <a:r>
-              <a:rPr lang="en-US" sz="1800" kern="0" dirty="0">
-                <a:solidFill>
-                  <a:srgbClr val="000000"/>
-                </a:solidFill>
-                <a:effectLst/>
-                <a:latin typeface="Segoe UI" panose="020B0502040204020203" pitchFamily="34" charset="0"/>
-                <a:ea typeface="Times New Roman" panose="02020603050405020304" pitchFamily="18" charset="0"/>
-                <a:cs typeface="Times New Roman" panose="02020603050405020304" pitchFamily="18" charset="0"/>
-              </a:rPr>
-              <a:t>From Nov 2020 to April 2021, Units sold remained relatively stable and flat while revenue soared to near 17 billion dollars on the same volume of cars sold. Why is that?</a:t>
-            </a:r>
-            <a:endParaRPr lang="en-US" sz="1800" kern="100" dirty="0">
-              <a:effectLst/>
-              <a:latin typeface="Calibri" panose="020F0502020204030204" pitchFamily="34" charset="0"/>
-              <a:ea typeface="Calibri" panose="020F0502020204030204" pitchFamily="34" charset="0"/>
-              <a:cs typeface="Times New Roman" panose="02020603050405020304" pitchFamily="18" charset="0"/>
-            </a:endParaRPr>
-          </a:p>
-          <a:p>
-            <a:pPr marL="171450" marR="0" lvl="0" indent="-171450" algn="l" defTabSz="914400" rtl="0" eaLnBrk="1" fontAlgn="auto" latinLnBrk="0" hangingPunct="1">
-              <a:lnSpc>
-                <a:spcPct val="100000"/>
-              </a:lnSpc>
-              <a:spcBef>
-                <a:spcPts val="0"/>
-              </a:spcBef>
-              <a:spcAft>
-                <a:spcPts val="0"/>
-              </a:spcAft>
-              <a:buClrTx/>
-              <a:buSzTx/>
-              <a:buFont typeface="Arial" panose="020B0604020202020204" pitchFamily="34" charset="0"/>
-              <a:buChar char="•"/>
-              <a:tabLst/>
-              <a:defRPr/>
-            </a:pPr>
+              <a:t>So while total sales declined 20%....Total Revenue made actually rose by 27%. Why is that??</a:t>
+            </a:r>
             <a:endParaRPr lang="en-US" sz="1800" kern="100" dirty="0">
               <a:effectLst/>
               <a:latin typeface="Calibri" panose="020F0502020204030204" pitchFamily="34" charset="0"/>
@@ -1228,7 +1213,31 @@
                 <a:ea typeface="Times New Roman" panose="02020603050405020304" pitchFamily="18" charset="0"/>
                 <a:cs typeface="Times New Roman" panose="02020603050405020304" pitchFamily="18" charset="0"/>
               </a:rPr>
-              <a:t>The CPI index gives us an idea. </a:t>
+              <a:t>Were prices or values </a:t>
+            </a:r>
+            <a:r>
+              <a:rPr lang="en-US" sz="1800" kern="0">
+                <a:solidFill>
+                  <a:srgbClr val="000000"/>
+                </a:solidFill>
+                <a:effectLst/>
+                <a:latin typeface="Segoe UI" panose="020B0502040204020203" pitchFamily="34" charset="0"/>
+                <a:ea typeface="Times New Roman" panose="02020603050405020304" pitchFamily="18" charset="0"/>
+                <a:cs typeface="Times New Roman" panose="02020603050405020304" pitchFamily="18" charset="0"/>
+              </a:rPr>
+              <a:t>different? The </a:t>
+            </a:r>
+            <a:r>
+              <a:rPr lang="en-US" sz="1800" kern="0" dirty="0">
+                <a:solidFill>
+                  <a:srgbClr val="000000"/>
+                </a:solidFill>
+                <a:effectLst/>
+                <a:latin typeface="Segoe UI" panose="020B0502040204020203" pitchFamily="34" charset="0"/>
+                <a:ea typeface="Times New Roman" panose="02020603050405020304" pitchFamily="18" charset="0"/>
+                <a:cs typeface="Times New Roman" panose="02020603050405020304" pitchFamily="18" charset="0"/>
+              </a:rPr>
+              <a:t>CPI index gives us an idea. </a:t>
             </a:r>
             <a:endParaRPr lang="en-US" sz="1800" kern="100" dirty="0">
               <a:effectLst/>

</xml_diff>